<commit_message>
minor updates on slides
</commit_message>
<xml_diff>
--- a/Unified IPv6 Transition Framework With Flow-based Forwarding.pptx
+++ b/Unified IPv6 Transition Framework With Flow-based Forwarding.pptx
@@ -5647,7 +5647,7 @@
         </p:nvSpPr>
         <p:spPr>
           <a:xfrm>
-            <a:off x="6343611" y="5940603"/>
+            <a:off x="6343611" y="5938222"/>
             <a:ext cx="1778482" cy="461665"/>
           </a:xfrm>
           <a:prstGeom prst="rect">
@@ -5742,7 +5742,7 @@
         </p:nvSpPr>
         <p:spPr>
           <a:xfrm>
-            <a:off x="2952751" y="4685850"/>
+            <a:off x="2952751" y="4678706"/>
             <a:ext cx="781366" cy="461665"/>
           </a:xfrm>
           <a:prstGeom prst="rect">
@@ -9426,7 +9426,7 @@
             </a:br>
             <a:r>
               <a:rPr lang="en-US" altLang="zh-CN" sz="2000" dirty="0" smtClean="0"/>
-              <a:t>(Can also delay to the first </a:t>
+              <a:t>(Can also delay until the first </a:t>
             </a:r>
             <a:r>
               <a:rPr lang="en-US" altLang="zh-CN" sz="2000" dirty="0" err="1" smtClean="0"/>
@@ -10131,23 +10131,11 @@
           <a:p>
             <a:r>
               <a:rPr lang="en-US" altLang="zh-CN" sz="2000" dirty="0" smtClean="0"/>
-              <a:t>Controller installs forwarding rules in BR Switch (per-subscriber)</a:t>
+              <a:t>For every binding state: Controller installs forwarding rules in BR Switch (per-subscriber)</a:t>
             </a:r>
             <a:br>
               <a:rPr lang="en-US" altLang="zh-CN" sz="2000" dirty="0" smtClean="0"/>
             </a:br>
-            <a:r>
-              <a:rPr lang="en-US" altLang="zh-CN" sz="2000" dirty="0" smtClean="0"/>
-              <a:t>(Can also move to the first </a:t>
-            </a:r>
-            <a:r>
-              <a:rPr lang="en-US" altLang="zh-CN" sz="2000" dirty="0" err="1" smtClean="0"/>
-              <a:t>packet_in</a:t>
-            </a:r>
-            <a:r>
-              <a:rPr lang="en-US" altLang="zh-CN" sz="2000" dirty="0" smtClean="0"/>
-              <a:t> from the CPE)</a:t>
-            </a:r>
             <a:endParaRPr lang="en-US" altLang="zh-CN" sz="2000" dirty="0"/>
           </a:p>
         </p:txBody>
@@ -10732,7 +10720,7 @@
         </p:nvSpPr>
         <p:spPr>
           <a:xfrm>
-            <a:off x="5678608" y="4937679"/>
+            <a:off x="5678608" y="4935298"/>
             <a:ext cx="1778482" cy="461665"/>
           </a:xfrm>
           <a:prstGeom prst="rect">
@@ -10838,7 +10826,7 @@
         </p:nvSpPr>
         <p:spPr>
           <a:xfrm>
-            <a:off x="5680091" y="3794756"/>
+            <a:off x="5680091" y="3792375"/>
             <a:ext cx="1778482" cy="461665"/>
           </a:xfrm>
           <a:prstGeom prst="rect">

</xml_diff>

<commit_message>
modify slides not completed
</commit_message>
<xml_diff>
--- a/Unified IPv6 Transition Framework With Flow-based Forwarding.pptx
+++ b/Unified IPv6 Transition Framework With Flow-based Forwarding.pptx
@@ -11,8 +11,8 @@
     <p:sldId id="268" r:id="rId2"/>
     <p:sldId id="269" r:id="rId3"/>
     <p:sldId id="270" r:id="rId4"/>
-    <p:sldId id="279" r:id="rId5"/>
-    <p:sldId id="272" r:id="rId6"/>
+    <p:sldId id="272" r:id="rId5"/>
+    <p:sldId id="286" r:id="rId6"/>
     <p:sldId id="278" r:id="rId7"/>
     <p:sldId id="284" r:id="rId8"/>
     <p:sldId id="283" r:id="rId9"/>
@@ -208,7 +208,7 @@
           <a:p>
             <a:fld id="{BC1F1C0D-D027-4248-B75E-841B5EFC3DB9}" type="datetimeFigureOut">
               <a:rPr lang="zh-CN" altLang="en-US" smtClean="0"/>
-              <a:t>2014/7/1</a:t>
+              <a:t>2014/7/14</a:t>
             </a:fld>
             <a:endParaRPr lang="zh-CN" altLang="en-US"/>
           </a:p>
@@ -672,7 +672,7 @@
     </p:spTree>
     <p:extLst>
       <p:ext uri="{BB962C8B-B14F-4D97-AF65-F5344CB8AC3E}">
-        <p14:creationId xmlns:p14="http://schemas.microsoft.com/office/powerpoint/2010/main" val="2020089318"/>
+        <p14:creationId xmlns:p14="http://schemas.microsoft.com/office/powerpoint/2010/main" val="671819528"/>
       </p:ext>
     </p:extLst>
   </p:cSld>
@@ -756,7 +756,7 @@
     </p:spTree>
     <p:extLst>
       <p:ext uri="{BB962C8B-B14F-4D97-AF65-F5344CB8AC3E}">
-        <p14:creationId xmlns:p14="http://schemas.microsoft.com/office/powerpoint/2010/main" val="671819528"/>
+        <p14:creationId xmlns:p14="http://schemas.microsoft.com/office/powerpoint/2010/main" val="2917050281"/>
       </p:ext>
     </p:extLst>
   </p:cSld>
@@ -1334,7 +1334,7 @@
           <a:p>
             <a:fld id="{FD7E16AD-3503-425D-8337-E2285692F2A3}" type="datetimeFigureOut">
               <a:rPr lang="zh-CN" altLang="en-US" smtClean="0"/>
-              <a:t>2014/7/1</a:t>
+              <a:t>2014/7/14</a:t>
             </a:fld>
             <a:endParaRPr lang="zh-CN" altLang="en-US"/>
           </a:p>
@@ -1504,7 +1504,7 @@
           <a:p>
             <a:fld id="{FD7E16AD-3503-425D-8337-E2285692F2A3}" type="datetimeFigureOut">
               <a:rPr lang="zh-CN" altLang="en-US" smtClean="0"/>
-              <a:t>2014/7/1</a:t>
+              <a:t>2014/7/14</a:t>
             </a:fld>
             <a:endParaRPr lang="zh-CN" altLang="en-US"/>
           </a:p>
@@ -1684,7 +1684,7 @@
           <a:p>
             <a:fld id="{FD7E16AD-3503-425D-8337-E2285692F2A3}" type="datetimeFigureOut">
               <a:rPr lang="zh-CN" altLang="en-US" smtClean="0"/>
-              <a:t>2014/7/1</a:t>
+              <a:t>2014/7/14</a:t>
             </a:fld>
             <a:endParaRPr lang="zh-CN" altLang="en-US"/>
           </a:p>
@@ -1854,7 +1854,7 @@
           <a:p>
             <a:fld id="{FD7E16AD-3503-425D-8337-E2285692F2A3}" type="datetimeFigureOut">
               <a:rPr lang="zh-CN" altLang="en-US" smtClean="0"/>
-              <a:t>2014/7/1</a:t>
+              <a:t>2014/7/14</a:t>
             </a:fld>
             <a:endParaRPr lang="zh-CN" altLang="en-US"/>
           </a:p>
@@ -2098,7 +2098,7 @@
           <a:p>
             <a:fld id="{FD7E16AD-3503-425D-8337-E2285692F2A3}" type="datetimeFigureOut">
               <a:rPr lang="zh-CN" altLang="en-US" smtClean="0"/>
-              <a:t>2014/7/1</a:t>
+              <a:t>2014/7/14</a:t>
             </a:fld>
             <a:endParaRPr lang="zh-CN" altLang="en-US"/>
           </a:p>
@@ -2330,7 +2330,7 @@
           <a:p>
             <a:fld id="{FD7E16AD-3503-425D-8337-E2285692F2A3}" type="datetimeFigureOut">
               <a:rPr lang="zh-CN" altLang="en-US" smtClean="0"/>
-              <a:t>2014/7/1</a:t>
+              <a:t>2014/7/14</a:t>
             </a:fld>
             <a:endParaRPr lang="zh-CN" altLang="en-US"/>
           </a:p>
@@ -2697,7 +2697,7 @@
           <a:p>
             <a:fld id="{FD7E16AD-3503-425D-8337-E2285692F2A3}" type="datetimeFigureOut">
               <a:rPr lang="zh-CN" altLang="en-US" smtClean="0"/>
-              <a:t>2014/7/1</a:t>
+              <a:t>2014/7/14</a:t>
             </a:fld>
             <a:endParaRPr lang="zh-CN" altLang="en-US"/>
           </a:p>
@@ -2815,7 +2815,7 @@
           <a:p>
             <a:fld id="{FD7E16AD-3503-425D-8337-E2285692F2A3}" type="datetimeFigureOut">
               <a:rPr lang="zh-CN" altLang="en-US" smtClean="0"/>
-              <a:t>2014/7/1</a:t>
+              <a:t>2014/7/14</a:t>
             </a:fld>
             <a:endParaRPr lang="zh-CN" altLang="en-US"/>
           </a:p>
@@ -2910,7 +2910,7 @@
           <a:p>
             <a:fld id="{FD7E16AD-3503-425D-8337-E2285692F2A3}" type="datetimeFigureOut">
               <a:rPr lang="zh-CN" altLang="en-US" smtClean="0"/>
-              <a:t>2014/7/1</a:t>
+              <a:t>2014/7/14</a:t>
             </a:fld>
             <a:endParaRPr lang="zh-CN" altLang="en-US"/>
           </a:p>
@@ -3187,7 +3187,7 @@
           <a:p>
             <a:fld id="{FD7E16AD-3503-425D-8337-E2285692F2A3}" type="datetimeFigureOut">
               <a:rPr lang="zh-CN" altLang="en-US" smtClean="0"/>
-              <a:t>2014/7/1</a:t>
+              <a:t>2014/7/14</a:t>
             </a:fld>
             <a:endParaRPr lang="zh-CN" altLang="en-US"/>
           </a:p>
@@ -3444,7 +3444,7 @@
           <a:p>
             <a:fld id="{FD7E16AD-3503-425D-8337-E2285692F2A3}" type="datetimeFigureOut">
               <a:rPr lang="zh-CN" altLang="en-US" smtClean="0"/>
-              <a:t>2014/7/1</a:t>
+              <a:t>2014/7/14</a:t>
             </a:fld>
             <a:endParaRPr lang="zh-CN" altLang="en-US"/>
           </a:p>
@@ -3657,7 +3657,7 @@
           <a:p>
             <a:fld id="{FD7E16AD-3503-425D-8337-E2285692F2A3}" type="datetimeFigureOut">
               <a:rPr lang="zh-CN" altLang="en-US" smtClean="0"/>
-              <a:t>2014/7/1</a:t>
+              <a:t>2014/7/14</a:t>
             </a:fld>
             <a:endParaRPr lang="zh-CN" altLang="en-US"/>
           </a:p>
@@ -4155,7 +4155,7 @@
               <a:t>draft-cui-softwire-unified-v6-framework-00</a:t>
             </a:r>
             <a:r>
-              <a:rPr lang="en-US" altLang="zh-CN" dirty="0">
+              <a:rPr lang="en-US" altLang="zh-CN">
                 <a:solidFill>
                   <a:srgbClr val="A6A6A6"/>
                 </a:solidFill>
@@ -4165,7 +4165,7 @@
               <a:t/>
             </a:r>
             <a:br>
-              <a:rPr lang="en-US" altLang="zh-CN" dirty="0">
+              <a:rPr lang="en-US" altLang="zh-CN">
                 <a:solidFill>
                   <a:srgbClr val="A6A6A6"/>
                 </a:solidFill>
@@ -4174,14 +4174,14 @@
               </a:rPr>
             </a:br>
             <a:r>
-              <a:rPr lang="en-US" altLang="zh-CN" dirty="0">
+              <a:rPr lang="en-US" altLang="zh-CN" smtClean="0">
                 <a:solidFill>
                   <a:srgbClr val="A6A6A6"/>
                 </a:solidFill>
                 <a:ea typeface="宋体" charset="0"/>
                 <a:cs typeface="宋体" charset="0"/>
               </a:rPr>
-              <a:t>(was draft-cui-intarea-unified-v6-framework-01)</a:t>
+              <a:t>Presenter: Cong Liu</a:t>
             </a:r>
             <a:endParaRPr kumimoji="0" lang="en-US" altLang="zh-CN" sz="2400" dirty="0">
               <a:solidFill>
@@ -4712,7 +4712,7 @@
                 </a:solidFill>
                 <a:ea typeface="微软雅黑" pitchFamily="34" charset="-122"/>
               </a:rPr>
-              <a:t>Status</a:t>
+              <a:t>Next Step</a:t>
             </a:r>
             <a:endParaRPr lang="zh-CN" altLang="en-US" dirty="0">
               <a:solidFill>
@@ -4872,39 +4872,14 @@
           <a:lstStyle/>
           <a:p>
             <a:r>
-              <a:rPr lang="en-US" altLang="zh-CN" dirty="0"/>
-              <a:t>Individual </a:t>
-            </a:r>
-            <a:r>
               <a:rPr lang="en-US" altLang="zh-CN" dirty="0" smtClean="0"/>
-              <a:t>draft submitted to </a:t>
-            </a:r>
-            <a:r>
-              <a:rPr lang="en-US" altLang="zh-CN" dirty="0" err="1" smtClean="0"/>
-              <a:t>int</a:t>
-            </a:r>
+              <a:t>Comments?</a:t>
+            </a:r>
+          </a:p>
+          <a:p>
             <a:r>
               <a:rPr lang="en-US" altLang="zh-CN" dirty="0" smtClean="0"/>
-              <a:t>-area WG: </a:t>
-            </a:r>
-            <a:r>
-              <a:rPr lang="en-US" altLang="zh-CN" dirty="0">
-                <a:hlinkClick r:id="rId3"/>
-              </a:rPr>
-              <a:t>http://</a:t>
-            </a:r>
-            <a:r>
-              <a:rPr lang="en-US" altLang="zh-CN" dirty="0" smtClean="0">
-                <a:hlinkClick r:id="rId3"/>
-              </a:rPr>
-              <a:t>tools.ietf.org/html/draft-cui-intarea-unified-v6-framework-01</a:t>
-            </a:r>
-            <a:endParaRPr lang="en-US" altLang="zh-CN" dirty="0" smtClean="0"/>
-          </a:p>
-          <a:p>
-            <a:r>
-              <a:rPr lang="en-US" altLang="zh-CN" dirty="0" smtClean="0"/>
-              <a:t>Presented in IETF89 </a:t>
+              <a:t>Move forward in </a:t>
             </a:r>
             <a:r>
               <a:rPr lang="en-US" altLang="zh-CN" dirty="0" err="1" smtClean="0"/>
@@ -4912,8 +4887,9 @@
             </a:r>
             <a:r>
               <a:rPr lang="en-US" altLang="zh-CN" dirty="0" smtClean="0"/>
-              <a:t> WG meeting</a:t>
-            </a:r>
+              <a:t> Workgroup?</a:t>
+            </a:r>
+            <a:endParaRPr lang="en-US" altLang="zh-CN" dirty="0" smtClean="0"/>
           </a:p>
         </p:txBody>
       </p:sp>
@@ -5268,11 +5244,7 @@
           <a:p>
             <a:r>
               <a:rPr lang="en-US" altLang="zh-CN" sz="2800" dirty="0" smtClean="0"/>
-              <a:t>More </a:t>
-            </a:r>
-            <a:r>
-              <a:rPr lang="en-US" altLang="zh-CN" sz="2800" dirty="0" smtClean="0"/>
-              <a:t>flexible and cost </a:t>
+              <a:t>More flexible and cost </a:t>
             </a:r>
             <a:r>
               <a:rPr lang="en-US" altLang="zh-CN" sz="2800" dirty="0"/>
@@ -5288,11 +5260,7 @@
             </a:r>
             <a:r>
               <a:rPr lang="en-US" altLang="zh-CN" sz="2800" dirty="0" smtClean="0"/>
-              <a:t> defined </a:t>
-            </a:r>
-            <a:r>
-              <a:rPr lang="en-US" altLang="zh-CN" sz="2800" dirty="0" smtClean="0"/>
-              <a:t>networking</a:t>
+              <a:t> defined networking</a:t>
             </a:r>
           </a:p>
           <a:p>
@@ -5308,7 +5276,6 @@
               <a:rPr lang="en-US" altLang="zh-CN" sz="2400" dirty="0" smtClean="0"/>
               <a:t>Same forwarding device for all mechanisms</a:t>
             </a:r>
-            <a:endParaRPr lang="en-US" altLang="zh-CN" sz="2400" dirty="0" smtClean="0"/>
           </a:p>
         </p:txBody>
       </p:sp>
@@ -5426,70 +5393,63 @@
           </a:xfrm>
         </p:spPr>
         <p:txBody>
-          <a:bodyPr/>
-          <a:lstStyle/>
-          <a:p>
-            <a:r>
-              <a:rPr lang="en-US" altLang="zh-CN" sz="2800" dirty="0" smtClean="0"/>
+          <a:bodyPr>
+            <a:normAutofit/>
+          </a:bodyPr>
+          <a:lstStyle/>
+          <a:p>
+            <a:r>
+              <a:rPr lang="en-US" altLang="zh-CN" sz="2000" dirty="0" smtClean="0"/>
               <a:t>Design a unified framework for IPv6 transition</a:t>
             </a:r>
           </a:p>
           <a:p>
             <a:pPr lvl="1"/>
             <a:r>
-              <a:rPr lang="en-US" altLang="zh-CN" sz="2400" dirty="0" smtClean="0"/>
+              <a:rPr lang="en-US" altLang="zh-CN" sz="1800" dirty="0" smtClean="0"/>
               <a:t>Support IPv4 over IPv6 </a:t>
             </a:r>
             <a:r>
-              <a:rPr lang="en-US" altLang="zh-CN" dirty="0"/>
+              <a:rPr lang="en-US" altLang="zh-CN" sz="1800" dirty="0"/>
               <a:t>tunneling </a:t>
             </a:r>
             <a:r>
-              <a:rPr lang="en-US" altLang="zh-CN" dirty="0" smtClean="0"/>
+              <a:rPr lang="en-US" altLang="zh-CN" sz="1800" dirty="0" smtClean="0"/>
               <a:t>scenario</a:t>
             </a:r>
-            <a:endParaRPr lang="en-US" altLang="zh-CN" sz="2400" dirty="0" smtClean="0"/>
           </a:p>
           <a:p>
             <a:pPr lvl="1"/>
             <a:r>
-              <a:rPr lang="en-US" altLang="zh-CN" sz="2400" dirty="0" smtClean="0"/>
+              <a:rPr lang="en-US" altLang="zh-CN" sz="1800" dirty="0" smtClean="0"/>
               <a:t>Reduce unnecessary configuration/operations in current mechanisms</a:t>
             </a:r>
           </a:p>
           <a:p>
             <a:r>
-              <a:rPr lang="en-US" altLang="zh-CN" sz="2800" dirty="0" smtClean="0"/>
+              <a:rPr lang="en-US" altLang="zh-CN" sz="2000" dirty="0" smtClean="0"/>
               <a:t>Based on SDN</a:t>
             </a:r>
           </a:p>
           <a:p>
             <a:pPr lvl="1"/>
             <a:r>
-              <a:rPr lang="en-US" altLang="zh-CN" sz="2400" dirty="0" smtClean="0"/>
-              <a:t>Replace </a:t>
-            </a:r>
-            <a:r>
-              <a:rPr lang="en-US" altLang="zh-CN" sz="2400" dirty="0" smtClean="0"/>
-              <a:t>routers (CPE/BR/AFTR) </a:t>
-            </a:r>
-            <a:r>
-              <a:rPr lang="en-US" altLang="zh-CN" sz="2400" dirty="0" smtClean="0"/>
-              <a:t>with </a:t>
-            </a:r>
-            <a:r>
-              <a:rPr lang="en-US" altLang="zh-CN" sz="2400" dirty="0" err="1" smtClean="0"/>
+              <a:rPr lang="en-US" altLang="zh-CN" sz="1800" dirty="0" smtClean="0"/>
+              <a:t>Replace routers (CPE/BR/AFTR) with </a:t>
+            </a:r>
+            <a:r>
+              <a:rPr lang="en-US" altLang="zh-CN" sz="1800" dirty="0" err="1" smtClean="0"/>
               <a:t>OpenFlow</a:t>
             </a:r>
             <a:r>
-              <a:rPr lang="en-US" altLang="zh-CN" sz="2400" dirty="0" smtClean="0"/>
+              <a:rPr lang="en-US" altLang="zh-CN" sz="1800" dirty="0" smtClean="0"/>
               <a:t> switches</a:t>
             </a:r>
           </a:p>
           <a:p>
             <a:pPr lvl="1"/>
             <a:r>
-              <a:rPr lang="en-US" altLang="zh-CN" sz="2400" dirty="0" smtClean="0"/>
+              <a:rPr lang="en-US" altLang="zh-CN" sz="1800" dirty="0" smtClean="0"/>
               <a:t>Use centralized controller to define network behavior, and manage devices</a:t>
             </a:r>
           </a:p>
@@ -5518,6 +5478,798 @@
           </a:p>
         </p:txBody>
       </p:sp>
+      <p:grpSp>
+        <p:nvGrpSpPr>
+          <p:cNvPr id="22" name="组合 21"/>
+          <p:cNvGrpSpPr/>
+          <p:nvPr/>
+        </p:nvGrpSpPr>
+        <p:grpSpPr>
+          <a:xfrm>
+            <a:off x="1156771" y="3710873"/>
+            <a:ext cx="6427703" cy="3064927"/>
+            <a:chOff x="953304" y="2331652"/>
+            <a:chExt cx="7409530" cy="4389824"/>
+          </a:xfrm>
+        </p:grpSpPr>
+        <p:sp>
+          <p:nvSpPr>
+            <p:cNvPr id="5" name="圆角矩形 4"/>
+            <p:cNvSpPr/>
+            <p:nvPr/>
+          </p:nvSpPr>
+          <p:spPr>
+            <a:xfrm>
+              <a:off x="2456762" y="4380552"/>
+              <a:ext cx="1355074" cy="793215"/>
+            </a:xfrm>
+            <a:prstGeom prst="roundRect">
+              <a:avLst/>
+            </a:prstGeom>
+          </p:spPr>
+          <p:style>
+            <a:lnRef idx="1">
+              <a:schemeClr val="accent6"/>
+            </a:lnRef>
+            <a:fillRef idx="2">
+              <a:schemeClr val="accent6"/>
+            </a:fillRef>
+            <a:effectRef idx="1">
+              <a:schemeClr val="accent6"/>
+            </a:effectRef>
+            <a:fontRef idx="minor">
+              <a:schemeClr val="dk1"/>
+            </a:fontRef>
+          </p:style>
+          <p:txBody>
+            <a:bodyPr rtlCol="0" anchor="ctr"/>
+            <a:lstStyle/>
+            <a:p>
+              <a:pPr algn="ctr"/>
+              <a:r>
+                <a:rPr lang="en-US" altLang="zh-CN" sz="1400" dirty="0" smtClean="0"/>
+                <a:t>CPE Switch</a:t>
+              </a:r>
+              <a:endParaRPr lang="zh-CN" altLang="en-US" sz="1400" dirty="0"/>
+            </a:p>
+          </p:txBody>
+        </p:sp>
+        <p:sp>
+          <p:nvSpPr>
+            <p:cNvPr id="6" name="圆角矩形 5"/>
+            <p:cNvSpPr/>
+            <p:nvPr/>
+          </p:nvSpPr>
+          <p:spPr>
+            <a:xfrm>
+              <a:off x="5445086" y="4380552"/>
+              <a:ext cx="1355074" cy="793215"/>
+            </a:xfrm>
+            <a:prstGeom prst="roundRect">
+              <a:avLst/>
+            </a:prstGeom>
+          </p:spPr>
+          <p:style>
+            <a:lnRef idx="1">
+              <a:schemeClr val="accent6"/>
+            </a:lnRef>
+            <a:fillRef idx="2">
+              <a:schemeClr val="accent6"/>
+            </a:fillRef>
+            <a:effectRef idx="1">
+              <a:schemeClr val="accent6"/>
+            </a:effectRef>
+            <a:fontRef idx="minor">
+              <a:schemeClr val="dk1"/>
+            </a:fontRef>
+          </p:style>
+          <p:txBody>
+            <a:bodyPr rtlCol="0" anchor="ctr"/>
+            <a:lstStyle/>
+            <a:p>
+              <a:pPr algn="ctr"/>
+              <a:r>
+                <a:rPr lang="en-US" altLang="zh-CN" sz="1400" dirty="0" smtClean="0"/>
+                <a:t>BR Switch</a:t>
+              </a:r>
+              <a:endParaRPr lang="zh-CN" altLang="en-US" sz="1400" dirty="0"/>
+            </a:p>
+          </p:txBody>
+        </p:sp>
+        <p:sp>
+          <p:nvSpPr>
+            <p:cNvPr id="7" name="圆角矩形 6"/>
+            <p:cNvSpPr/>
+            <p:nvPr/>
+          </p:nvSpPr>
+          <p:spPr>
+            <a:xfrm>
+              <a:off x="3949547" y="4380552"/>
+              <a:ext cx="1355074" cy="793215"/>
+            </a:xfrm>
+            <a:prstGeom prst="roundRect">
+              <a:avLst/>
+            </a:prstGeom>
+          </p:spPr>
+          <p:style>
+            <a:lnRef idx="1">
+              <a:schemeClr val="accent3"/>
+            </a:lnRef>
+            <a:fillRef idx="2">
+              <a:schemeClr val="accent3"/>
+            </a:fillRef>
+            <a:effectRef idx="1">
+              <a:schemeClr val="accent3"/>
+            </a:effectRef>
+            <a:fontRef idx="minor">
+              <a:schemeClr val="dk1"/>
+            </a:fontRef>
+          </p:style>
+          <p:txBody>
+            <a:bodyPr rtlCol="0" anchor="ctr"/>
+            <a:lstStyle/>
+            <a:p>
+              <a:pPr algn="ctr"/>
+              <a:r>
+                <a:rPr lang="en-US" altLang="zh-CN" sz="1400" dirty="0" smtClean="0"/>
+                <a:t>ISP IPv6 Network</a:t>
+              </a:r>
+              <a:endParaRPr lang="zh-CN" altLang="en-US" sz="1400" dirty="0"/>
+            </a:p>
+          </p:txBody>
+        </p:sp>
+        <p:sp>
+          <p:nvSpPr>
+            <p:cNvPr id="8" name="圆角矩形 7"/>
+            <p:cNvSpPr/>
+            <p:nvPr/>
+          </p:nvSpPr>
+          <p:spPr>
+            <a:xfrm>
+              <a:off x="953304" y="4380552"/>
+              <a:ext cx="1355074" cy="793215"/>
+            </a:xfrm>
+            <a:prstGeom prst="roundRect">
+              <a:avLst/>
+            </a:prstGeom>
+          </p:spPr>
+          <p:style>
+            <a:lnRef idx="1">
+              <a:schemeClr val="accent3"/>
+            </a:lnRef>
+            <a:fillRef idx="2">
+              <a:schemeClr val="accent3"/>
+            </a:fillRef>
+            <a:effectRef idx="1">
+              <a:schemeClr val="accent3"/>
+            </a:effectRef>
+            <a:fontRef idx="minor">
+              <a:schemeClr val="dk1"/>
+            </a:fontRef>
+          </p:style>
+          <p:txBody>
+            <a:bodyPr rtlCol="0" anchor="ctr"/>
+            <a:lstStyle/>
+            <a:p>
+              <a:pPr algn="ctr"/>
+              <a:r>
+                <a:rPr lang="en-US" altLang="zh-CN" sz="1400" dirty="0" smtClean="0"/>
+                <a:t>Customer Network</a:t>
+              </a:r>
+              <a:endParaRPr lang="zh-CN" altLang="en-US" sz="1400" dirty="0"/>
+            </a:p>
+          </p:txBody>
+        </p:sp>
+        <p:sp>
+          <p:nvSpPr>
+            <p:cNvPr id="9" name="圆角矩形 8"/>
+            <p:cNvSpPr/>
+            <p:nvPr/>
+          </p:nvSpPr>
+          <p:spPr>
+            <a:xfrm>
+              <a:off x="7007760" y="4380552"/>
+              <a:ext cx="1355074" cy="793215"/>
+            </a:xfrm>
+            <a:prstGeom prst="roundRect">
+              <a:avLst/>
+            </a:prstGeom>
+          </p:spPr>
+          <p:style>
+            <a:lnRef idx="1">
+              <a:schemeClr val="accent3"/>
+            </a:lnRef>
+            <a:fillRef idx="2">
+              <a:schemeClr val="accent3"/>
+            </a:fillRef>
+            <a:effectRef idx="1">
+              <a:schemeClr val="accent3"/>
+            </a:effectRef>
+            <a:fontRef idx="minor">
+              <a:schemeClr val="dk1"/>
+            </a:fontRef>
+          </p:style>
+          <p:txBody>
+            <a:bodyPr rtlCol="0" anchor="ctr"/>
+            <a:lstStyle/>
+            <a:p>
+              <a:pPr algn="ctr"/>
+              <a:r>
+                <a:rPr lang="en-US" altLang="zh-CN" sz="1400" dirty="0" smtClean="0"/>
+                <a:t>Internet</a:t>
+              </a:r>
+              <a:endParaRPr lang="zh-CN" altLang="en-US" sz="1400" dirty="0"/>
+            </a:p>
+          </p:txBody>
+        </p:sp>
+        <p:sp>
+          <p:nvSpPr>
+            <p:cNvPr id="10" name="圆角矩形 9"/>
+            <p:cNvSpPr/>
+            <p:nvPr/>
+          </p:nvSpPr>
+          <p:spPr>
+            <a:xfrm>
+              <a:off x="2459871" y="3740421"/>
+              <a:ext cx="4340644" cy="306302"/>
+            </a:xfrm>
+            <a:prstGeom prst="roundRect">
+              <a:avLst/>
+            </a:prstGeom>
+          </p:spPr>
+          <p:style>
+            <a:lnRef idx="1">
+              <a:schemeClr val="accent2"/>
+            </a:lnRef>
+            <a:fillRef idx="2">
+              <a:schemeClr val="accent2"/>
+            </a:fillRef>
+            <a:effectRef idx="1">
+              <a:schemeClr val="accent2"/>
+            </a:effectRef>
+            <a:fontRef idx="minor">
+              <a:schemeClr val="dk1"/>
+            </a:fontRef>
+          </p:style>
+          <p:txBody>
+            <a:bodyPr rtlCol="0" anchor="ctr"/>
+            <a:lstStyle/>
+            <a:p>
+              <a:pPr algn="ctr"/>
+              <a:r>
+                <a:rPr lang="en-US" altLang="zh-CN" sz="1400" dirty="0" smtClean="0"/>
+                <a:t>Controller</a:t>
+              </a:r>
+              <a:endParaRPr lang="zh-CN" altLang="en-US" sz="1400" dirty="0"/>
+            </a:p>
+          </p:txBody>
+        </p:sp>
+        <p:cxnSp>
+          <p:nvCxnSpPr>
+            <p:cNvPr id="11" name="直接连接符 10"/>
+            <p:cNvCxnSpPr>
+              <a:stCxn id="5" idx="3"/>
+              <a:endCxn id="7" idx="1"/>
+            </p:cNvCxnSpPr>
+            <p:nvPr/>
+          </p:nvCxnSpPr>
+          <p:spPr>
+            <a:xfrm>
+              <a:off x="3811836" y="4777160"/>
+              <a:ext cx="137711" cy="0"/>
+            </a:xfrm>
+            <a:prstGeom prst="line">
+              <a:avLst/>
+            </a:prstGeom>
+            <a:ln w="19050">
+              <a:headEnd type="none" w="med" len="med"/>
+              <a:tailEnd type="none" w="med" len="med"/>
+            </a:ln>
+          </p:spPr>
+          <p:style>
+            <a:lnRef idx="1">
+              <a:schemeClr val="dk1"/>
+            </a:lnRef>
+            <a:fillRef idx="0">
+              <a:schemeClr val="dk1"/>
+            </a:fillRef>
+            <a:effectRef idx="0">
+              <a:schemeClr val="dk1"/>
+            </a:effectRef>
+            <a:fontRef idx="minor">
+              <a:schemeClr val="tx1"/>
+            </a:fontRef>
+          </p:style>
+        </p:cxnSp>
+        <p:cxnSp>
+          <p:nvCxnSpPr>
+            <p:cNvPr id="12" name="直接连接符 11"/>
+            <p:cNvCxnSpPr>
+              <a:stCxn id="7" idx="3"/>
+              <a:endCxn id="6" idx="1"/>
+            </p:cNvCxnSpPr>
+            <p:nvPr/>
+          </p:nvCxnSpPr>
+          <p:spPr>
+            <a:xfrm>
+              <a:off x="5304621" y="4777160"/>
+              <a:ext cx="140465" cy="0"/>
+            </a:xfrm>
+            <a:prstGeom prst="line">
+              <a:avLst/>
+            </a:prstGeom>
+            <a:ln w="19050">
+              <a:headEnd type="none" w="med" len="med"/>
+              <a:tailEnd type="none" w="med" len="med"/>
+            </a:ln>
+          </p:spPr>
+          <p:style>
+            <a:lnRef idx="1">
+              <a:schemeClr val="dk1"/>
+            </a:lnRef>
+            <a:fillRef idx="0">
+              <a:schemeClr val="dk1"/>
+            </a:fillRef>
+            <a:effectRef idx="0">
+              <a:schemeClr val="dk1"/>
+            </a:effectRef>
+            <a:fontRef idx="minor">
+              <a:schemeClr val="tx1"/>
+            </a:fontRef>
+          </p:style>
+        </p:cxnSp>
+        <p:cxnSp>
+          <p:nvCxnSpPr>
+            <p:cNvPr id="13" name="直接连接符 12"/>
+            <p:cNvCxnSpPr>
+              <a:stCxn id="6" idx="3"/>
+              <a:endCxn id="9" idx="1"/>
+            </p:cNvCxnSpPr>
+            <p:nvPr/>
+          </p:nvCxnSpPr>
+          <p:spPr>
+            <a:xfrm>
+              <a:off x="6800160" y="4777160"/>
+              <a:ext cx="207600" cy="0"/>
+            </a:xfrm>
+            <a:prstGeom prst="line">
+              <a:avLst/>
+            </a:prstGeom>
+            <a:ln w="19050">
+              <a:headEnd type="none" w="med" len="med"/>
+              <a:tailEnd type="none" w="med" len="med"/>
+            </a:ln>
+          </p:spPr>
+          <p:style>
+            <a:lnRef idx="1">
+              <a:schemeClr val="dk1"/>
+            </a:lnRef>
+            <a:fillRef idx="0">
+              <a:schemeClr val="dk1"/>
+            </a:fillRef>
+            <a:effectRef idx="0">
+              <a:schemeClr val="dk1"/>
+            </a:effectRef>
+            <a:fontRef idx="minor">
+              <a:schemeClr val="tx1"/>
+            </a:fontRef>
+          </p:style>
+        </p:cxnSp>
+        <p:cxnSp>
+          <p:nvCxnSpPr>
+            <p:cNvPr id="14" name="直接连接符 13"/>
+            <p:cNvCxnSpPr>
+              <a:stCxn id="8" idx="3"/>
+              <a:endCxn id="5" idx="1"/>
+            </p:cNvCxnSpPr>
+            <p:nvPr/>
+          </p:nvCxnSpPr>
+          <p:spPr>
+            <a:xfrm>
+              <a:off x="2308378" y="4777160"/>
+              <a:ext cx="148384" cy="0"/>
+            </a:xfrm>
+            <a:prstGeom prst="line">
+              <a:avLst/>
+            </a:prstGeom>
+            <a:ln w="19050">
+              <a:headEnd type="none" w="med" len="med"/>
+              <a:tailEnd type="none" w="med" len="med"/>
+            </a:ln>
+          </p:spPr>
+          <p:style>
+            <a:lnRef idx="1">
+              <a:schemeClr val="dk1"/>
+            </a:lnRef>
+            <a:fillRef idx="0">
+              <a:schemeClr val="dk1"/>
+            </a:fillRef>
+            <a:effectRef idx="0">
+              <a:schemeClr val="dk1"/>
+            </a:effectRef>
+            <a:fontRef idx="minor">
+              <a:schemeClr val="tx1"/>
+            </a:fontRef>
+          </p:style>
+        </p:cxnSp>
+        <p:cxnSp>
+          <p:nvCxnSpPr>
+            <p:cNvPr id="15" name="直接箭头连接符 14"/>
+            <p:cNvCxnSpPr/>
+            <p:nvPr/>
+          </p:nvCxnSpPr>
+          <p:spPr>
+            <a:xfrm flipV="1">
+              <a:off x="2897436" y="4046723"/>
+              <a:ext cx="0" cy="333831"/>
+            </a:xfrm>
+            <a:prstGeom prst="straightConnector1">
+              <a:avLst/>
+            </a:prstGeom>
+            <a:ln w="19050">
+              <a:headEnd type="none" w="med" len="med"/>
+              <a:tailEnd type="arrow" w="med" len="med"/>
+            </a:ln>
+          </p:spPr>
+          <p:style>
+            <a:lnRef idx="1">
+              <a:schemeClr val="dk1"/>
+            </a:lnRef>
+            <a:fillRef idx="0">
+              <a:schemeClr val="dk1"/>
+            </a:fillRef>
+            <a:effectRef idx="0">
+              <a:schemeClr val="dk1"/>
+            </a:effectRef>
+            <a:fontRef idx="minor">
+              <a:schemeClr val="tx1"/>
+            </a:fontRef>
+          </p:style>
+        </p:cxnSp>
+        <p:cxnSp>
+          <p:nvCxnSpPr>
+            <p:cNvPr id="16" name="直接箭头连接符 15"/>
+            <p:cNvCxnSpPr/>
+            <p:nvPr/>
+          </p:nvCxnSpPr>
+          <p:spPr>
+            <a:xfrm flipV="1">
+              <a:off x="3349127" y="4046723"/>
+              <a:ext cx="0" cy="333831"/>
+            </a:xfrm>
+            <a:prstGeom prst="straightConnector1">
+              <a:avLst/>
+            </a:prstGeom>
+            <a:ln w="19050">
+              <a:headEnd type="arrow" w="med" len="med"/>
+              <a:tailEnd type="none" w="med" len="med"/>
+            </a:ln>
+          </p:spPr>
+          <p:style>
+            <a:lnRef idx="1">
+              <a:schemeClr val="dk1"/>
+            </a:lnRef>
+            <a:fillRef idx="0">
+              <a:schemeClr val="dk1"/>
+            </a:fillRef>
+            <a:effectRef idx="0">
+              <a:schemeClr val="dk1"/>
+            </a:effectRef>
+            <a:fontRef idx="minor">
+              <a:schemeClr val="tx1"/>
+            </a:fontRef>
+          </p:style>
+        </p:cxnSp>
+        <p:cxnSp>
+          <p:nvCxnSpPr>
+            <p:cNvPr id="17" name="直接箭头连接符 16"/>
+            <p:cNvCxnSpPr/>
+            <p:nvPr/>
+          </p:nvCxnSpPr>
+          <p:spPr>
+            <a:xfrm flipV="1">
+              <a:off x="5849956" y="4046723"/>
+              <a:ext cx="0" cy="333831"/>
+            </a:xfrm>
+            <a:prstGeom prst="straightConnector1">
+              <a:avLst/>
+            </a:prstGeom>
+            <a:ln w="19050">
+              <a:headEnd type="arrow" w="med" len="med"/>
+              <a:tailEnd type="none" w="med" len="med"/>
+            </a:ln>
+          </p:spPr>
+          <p:style>
+            <a:lnRef idx="1">
+              <a:schemeClr val="dk1"/>
+            </a:lnRef>
+            <a:fillRef idx="0">
+              <a:schemeClr val="dk1"/>
+            </a:fillRef>
+            <a:effectRef idx="0">
+              <a:schemeClr val="dk1"/>
+            </a:effectRef>
+            <a:fontRef idx="minor">
+              <a:schemeClr val="tx1"/>
+            </a:fontRef>
+          </p:style>
+        </p:cxnSp>
+        <p:cxnSp>
+          <p:nvCxnSpPr>
+            <p:cNvPr id="18" name="直接箭头连接符 17"/>
+            <p:cNvCxnSpPr/>
+            <p:nvPr/>
+          </p:nvCxnSpPr>
+          <p:spPr>
+            <a:xfrm flipV="1">
+              <a:off x="6301647" y="4046723"/>
+              <a:ext cx="0" cy="333831"/>
+            </a:xfrm>
+            <a:prstGeom prst="straightConnector1">
+              <a:avLst/>
+            </a:prstGeom>
+            <a:ln w="19050">
+              <a:headEnd type="none" w="med" len="med"/>
+              <a:tailEnd type="arrow" w="med" len="med"/>
+            </a:ln>
+          </p:spPr>
+          <p:style>
+            <a:lnRef idx="1">
+              <a:schemeClr val="dk1"/>
+            </a:lnRef>
+            <a:fillRef idx="0">
+              <a:schemeClr val="dk1"/>
+            </a:fillRef>
+            <a:effectRef idx="0">
+              <a:schemeClr val="dk1"/>
+            </a:effectRef>
+            <a:fontRef idx="minor">
+              <a:schemeClr val="tx1"/>
+            </a:fontRef>
+          </p:style>
+        </p:cxnSp>
+        <p:sp>
+          <p:nvSpPr>
+            <p:cNvPr id="19" name="矩形标注 18"/>
+            <p:cNvSpPr/>
+            <p:nvPr/>
+          </p:nvSpPr>
+          <p:spPr>
+            <a:xfrm>
+              <a:off x="1480275" y="5510966"/>
+              <a:ext cx="2331561" cy="1210510"/>
+            </a:xfrm>
+            <a:prstGeom prst="wedgeRectCallout">
+              <a:avLst>
+                <a:gd name="adj1" fmla="val 22637"/>
+                <a:gd name="adj2" fmla="val -76458"/>
+              </a:avLst>
+            </a:prstGeom>
+          </p:spPr>
+          <p:style>
+            <a:lnRef idx="1">
+              <a:schemeClr val="accent6"/>
+            </a:lnRef>
+            <a:fillRef idx="2">
+              <a:schemeClr val="accent6"/>
+            </a:fillRef>
+            <a:effectRef idx="1">
+              <a:schemeClr val="accent6"/>
+            </a:effectRef>
+            <a:fontRef idx="minor">
+              <a:schemeClr val="dk1"/>
+            </a:fontRef>
+          </p:style>
+          <p:txBody>
+            <a:bodyPr rtlCol="0" anchor="ctr"/>
+            <a:lstStyle/>
+            <a:p>
+              <a:pPr marL="285750" indent="-285750">
+                <a:buFont typeface="Arial" panose="020B0604020202020204" pitchFamily="34" charset="0"/>
+                <a:buChar char="•"/>
+              </a:pPr>
+              <a:r>
+                <a:rPr lang="en-US" altLang="zh-CN" sz="1100" dirty="0" err="1" smtClean="0"/>
+                <a:t>OpenFlow</a:t>
+              </a:r>
+              <a:r>
+                <a:rPr lang="en-US" altLang="zh-CN" sz="1100" dirty="0" smtClean="0"/>
+                <a:t> Switch</a:t>
+              </a:r>
+            </a:p>
+            <a:p>
+              <a:pPr marL="285750" indent="-285750">
+                <a:buFont typeface="Arial" panose="020B0604020202020204" pitchFamily="34" charset="0"/>
+                <a:buChar char="•"/>
+              </a:pPr>
+              <a:r>
+                <a:rPr lang="en-US" altLang="zh-CN" sz="1100" dirty="0" smtClean="0"/>
+                <a:t>Replace </a:t>
+              </a:r>
+              <a:r>
+                <a:rPr lang="en-US" altLang="zh-CN" sz="1100" dirty="0"/>
+                <a:t>MAP CE, lwB4, </a:t>
+              </a:r>
+              <a:r>
+                <a:rPr lang="en-US" altLang="zh-CN" sz="1100" dirty="0" smtClean="0"/>
+                <a:t>…</a:t>
+              </a:r>
+            </a:p>
+            <a:p>
+              <a:pPr marL="285750" indent="-285750">
+                <a:buFont typeface="Arial" panose="020B0604020202020204" pitchFamily="34" charset="0"/>
+                <a:buChar char="•"/>
+              </a:pPr>
+              <a:r>
+                <a:rPr lang="en-US" altLang="zh-CN" sz="1100" dirty="0" smtClean="0"/>
+                <a:t>As </a:t>
+              </a:r>
+              <a:r>
+                <a:rPr lang="en-US" altLang="zh-CN" sz="1100" dirty="0"/>
+                <a:t>customer network </a:t>
+              </a:r>
+              <a:r>
+                <a:rPr lang="en-US" altLang="zh-CN" sz="1100" dirty="0" smtClean="0"/>
+                <a:t>gateway</a:t>
+              </a:r>
+              <a:endParaRPr lang="en-US" altLang="zh-CN" sz="1100" dirty="0"/>
+            </a:p>
+          </p:txBody>
+        </p:sp>
+        <p:sp>
+          <p:nvSpPr>
+            <p:cNvPr id="20" name="矩形标注 19"/>
+            <p:cNvSpPr/>
+            <p:nvPr/>
+          </p:nvSpPr>
+          <p:spPr>
+            <a:xfrm>
+              <a:off x="5374853" y="5567199"/>
+              <a:ext cx="1748393" cy="901154"/>
+            </a:xfrm>
+            <a:prstGeom prst="wedgeRectCallout">
+              <a:avLst>
+                <a:gd name="adj1" fmla="val -16756"/>
+                <a:gd name="adj2" fmla="val -91205"/>
+              </a:avLst>
+            </a:prstGeom>
+          </p:spPr>
+          <p:style>
+            <a:lnRef idx="1">
+              <a:schemeClr val="accent6"/>
+            </a:lnRef>
+            <a:fillRef idx="2">
+              <a:schemeClr val="accent6"/>
+            </a:fillRef>
+            <a:effectRef idx="1">
+              <a:schemeClr val="accent6"/>
+            </a:effectRef>
+            <a:fontRef idx="minor">
+              <a:schemeClr val="dk1"/>
+            </a:fontRef>
+          </p:style>
+          <p:txBody>
+            <a:bodyPr rtlCol="0" anchor="ctr"/>
+            <a:lstStyle/>
+            <a:p>
+              <a:pPr marL="285750" indent="-285750">
+                <a:buFont typeface="Arial" panose="020B0604020202020204" pitchFamily="34" charset="0"/>
+                <a:buChar char="•"/>
+              </a:pPr>
+              <a:r>
+                <a:rPr lang="en-US" altLang="zh-CN" sz="1100" dirty="0" err="1" smtClean="0"/>
+                <a:t>OpenFlow</a:t>
+              </a:r>
+              <a:r>
+                <a:rPr lang="en-US" altLang="zh-CN" sz="1100" dirty="0" smtClean="0"/>
+                <a:t> Switch</a:t>
+              </a:r>
+            </a:p>
+            <a:p>
+              <a:pPr marL="285750" indent="-285750">
+                <a:buFont typeface="Arial" panose="020B0604020202020204" pitchFamily="34" charset="0"/>
+                <a:buChar char="•"/>
+              </a:pPr>
+              <a:r>
+                <a:rPr lang="en-US" altLang="zh-CN" sz="1100" dirty="0" smtClean="0"/>
+                <a:t>Replace </a:t>
+              </a:r>
+              <a:r>
+                <a:rPr lang="en-US" altLang="zh-CN" sz="1100" dirty="0"/>
+                <a:t>MAP BR, </a:t>
+              </a:r>
+              <a:r>
+                <a:rPr lang="en-US" altLang="zh-CN" sz="1100" dirty="0" err="1"/>
+                <a:t>lwAFTR</a:t>
+              </a:r>
+              <a:r>
+                <a:rPr lang="en-US" altLang="zh-CN" sz="1100" dirty="0"/>
+                <a:t>, </a:t>
+              </a:r>
+              <a:r>
+                <a:rPr lang="en-US" altLang="zh-CN" sz="1100" dirty="0" smtClean="0"/>
+                <a:t>…</a:t>
+              </a:r>
+            </a:p>
+          </p:txBody>
+        </p:sp>
+        <p:sp>
+          <p:nvSpPr>
+            <p:cNvPr id="21" name="矩形标注 20"/>
+            <p:cNvSpPr/>
+            <p:nvPr/>
+          </p:nvSpPr>
+          <p:spPr>
+            <a:xfrm>
+              <a:off x="4555473" y="2331652"/>
+              <a:ext cx="3492347" cy="973719"/>
+            </a:xfrm>
+            <a:prstGeom prst="wedgeRectCallout">
+              <a:avLst>
+                <a:gd name="adj1" fmla="val -45752"/>
+                <a:gd name="adj2" fmla="val 93560"/>
+              </a:avLst>
+            </a:prstGeom>
+          </p:spPr>
+          <p:style>
+            <a:lnRef idx="1">
+              <a:schemeClr val="accent2"/>
+            </a:lnRef>
+            <a:fillRef idx="2">
+              <a:schemeClr val="accent2"/>
+            </a:fillRef>
+            <a:effectRef idx="1">
+              <a:schemeClr val="accent2"/>
+            </a:effectRef>
+            <a:fontRef idx="minor">
+              <a:schemeClr val="dk1"/>
+            </a:fontRef>
+          </p:style>
+          <p:txBody>
+            <a:bodyPr rtlCol="0" anchor="ctr"/>
+            <a:lstStyle/>
+            <a:p>
+              <a:pPr marL="285750" lvl="1" indent="-285750">
+                <a:buFont typeface="Arial" panose="020B0604020202020204" pitchFamily="34" charset="0"/>
+                <a:buChar char="•"/>
+              </a:pPr>
+              <a:r>
+                <a:rPr lang="en-US" altLang="zh-CN" sz="1200" dirty="0" err="1" smtClean="0"/>
+                <a:t>OpenFlow</a:t>
+              </a:r>
+              <a:r>
+                <a:rPr lang="en-US" altLang="zh-CN" sz="1200" dirty="0" smtClean="0"/>
+                <a:t> Controller</a:t>
+              </a:r>
+            </a:p>
+            <a:p>
+              <a:pPr marL="285750" lvl="1" indent="-285750">
+                <a:buFont typeface="Arial" panose="020B0604020202020204" pitchFamily="34" charset="0"/>
+                <a:buChar char="•"/>
+              </a:pPr>
+              <a:r>
+                <a:rPr lang="en-US" altLang="zh-CN" sz="1200" dirty="0" smtClean="0"/>
+                <a:t>Manage CPE/BR </a:t>
+              </a:r>
+              <a:r>
+                <a:rPr lang="en-US" altLang="zh-CN" sz="1200" dirty="0"/>
+                <a:t>Switches: IP addressing, forwarding states, etc.</a:t>
+              </a:r>
+            </a:p>
+            <a:p>
+              <a:pPr marL="285750" lvl="1" indent="-285750">
+                <a:buFont typeface="Arial" panose="020B0604020202020204" pitchFamily="34" charset="0"/>
+                <a:buChar char="•"/>
+              </a:pPr>
+              <a:r>
+                <a:rPr lang="en-US" altLang="zh-CN" sz="1200" dirty="0" smtClean="0"/>
+                <a:t>May combined with DHCPv6 server</a:t>
+              </a:r>
+              <a:endParaRPr lang="en-US" altLang="zh-CN" sz="1200" dirty="0"/>
+            </a:p>
+          </p:txBody>
+        </p:sp>
+      </p:grpSp>
     </p:spTree>
     <p:extLst>
       <p:ext uri="{BB962C8B-B14F-4D97-AF65-F5344CB8AC3E}">
@@ -5539,861 +6291,7 @@
 </file>
 
 <file path=ppt/slides/slide4.xml><?xml version="1.0" encoding="utf-8"?>
-<p:sld xmlns:a="http://schemas.openxmlformats.org/drawingml/2006/main" xmlns:r="http://schemas.openxmlformats.org/officeDocument/2006/relationships" xmlns:p="http://schemas.openxmlformats.org/presentationml/2006/main">
-  <p:cSld>
-    <p:spTree>
-      <p:nvGrpSpPr>
-        <p:cNvPr id="1" name=""/>
-        <p:cNvGrpSpPr/>
-        <p:nvPr/>
-      </p:nvGrpSpPr>
-      <p:grpSpPr>
-        <a:xfrm>
-          <a:off x="0" y="0"/>
-          <a:ext cx="0" cy="0"/>
-          <a:chOff x="0" y="0"/>
-          <a:chExt cx="0" cy="0"/>
-        </a:xfrm>
-      </p:grpSpPr>
-      <p:sp>
-        <p:nvSpPr>
-          <p:cNvPr id="2" name="标题 1"/>
-          <p:cNvSpPr>
-            <a:spLocks noGrp="1"/>
-          </p:cNvSpPr>
-          <p:nvPr>
-            <p:ph type="title"/>
-          </p:nvPr>
-        </p:nvSpPr>
-        <p:spPr/>
-        <p:txBody>
-          <a:bodyPr/>
-          <a:lstStyle/>
-          <a:p>
-            <a:pPr algn="ctr"/>
-            <a:r>
-              <a:rPr lang="en-US" altLang="zh-CN" dirty="0" smtClean="0"/>
-              <a:t>Architecture</a:t>
-            </a:r>
-            <a:endParaRPr lang="zh-CN" altLang="en-US" dirty="0"/>
-          </a:p>
-        </p:txBody>
-      </p:sp>
-      <p:sp>
-        <p:nvSpPr>
-          <p:cNvPr id="3" name="内容占位符 2"/>
-          <p:cNvSpPr>
-            <a:spLocks noGrp="1"/>
-          </p:cNvSpPr>
-          <p:nvPr>
-            <p:ph idx="1"/>
-          </p:nvPr>
-        </p:nvSpPr>
-        <p:spPr/>
-        <p:txBody>
-          <a:bodyPr/>
-          <a:lstStyle/>
-          <a:p>
-            <a:endParaRPr lang="zh-CN" altLang="en-US" dirty="0"/>
-          </a:p>
-        </p:txBody>
-      </p:sp>
-      <p:sp>
-        <p:nvSpPr>
-          <p:cNvPr id="4" name="圆角矩形 3"/>
-          <p:cNvSpPr/>
-          <p:nvPr/>
-        </p:nvSpPr>
-        <p:spPr>
-          <a:xfrm>
-            <a:off x="2401678" y="4232647"/>
-            <a:ext cx="1355074" cy="793215"/>
-          </a:xfrm>
-          <a:prstGeom prst="roundRect">
-            <a:avLst/>
-          </a:prstGeom>
-        </p:spPr>
-        <p:style>
-          <a:lnRef idx="1">
-            <a:schemeClr val="accent6"/>
-          </a:lnRef>
-          <a:fillRef idx="2">
-            <a:schemeClr val="accent6"/>
-          </a:fillRef>
-          <a:effectRef idx="1">
-            <a:schemeClr val="accent6"/>
-          </a:effectRef>
-          <a:fontRef idx="minor">
-            <a:schemeClr val="dk1"/>
-          </a:fontRef>
-        </p:style>
-        <p:txBody>
-          <a:bodyPr rtlCol="0" anchor="ctr"/>
-          <a:lstStyle/>
-          <a:p>
-            <a:pPr algn="ctr"/>
-            <a:r>
-              <a:rPr lang="en-US" altLang="zh-CN" dirty="0" smtClean="0"/>
-              <a:t>CPE Switch</a:t>
-            </a:r>
-            <a:endParaRPr lang="zh-CN" altLang="en-US" dirty="0"/>
-          </a:p>
-        </p:txBody>
-      </p:sp>
-      <p:sp>
-        <p:nvSpPr>
-          <p:cNvPr id="5" name="圆角矩形 4"/>
-          <p:cNvSpPr/>
-          <p:nvPr/>
-        </p:nvSpPr>
-        <p:spPr>
-          <a:xfrm>
-            <a:off x="5390002" y="4232647"/>
-            <a:ext cx="1355074" cy="793215"/>
-          </a:xfrm>
-          <a:prstGeom prst="roundRect">
-            <a:avLst/>
-          </a:prstGeom>
-        </p:spPr>
-        <p:style>
-          <a:lnRef idx="1">
-            <a:schemeClr val="accent6"/>
-          </a:lnRef>
-          <a:fillRef idx="2">
-            <a:schemeClr val="accent6"/>
-          </a:fillRef>
-          <a:effectRef idx="1">
-            <a:schemeClr val="accent6"/>
-          </a:effectRef>
-          <a:fontRef idx="minor">
-            <a:schemeClr val="dk1"/>
-          </a:fontRef>
-        </p:style>
-        <p:txBody>
-          <a:bodyPr rtlCol="0" anchor="ctr"/>
-          <a:lstStyle/>
-          <a:p>
-            <a:pPr algn="ctr"/>
-            <a:r>
-              <a:rPr lang="en-US" altLang="zh-CN" dirty="0" smtClean="0"/>
-              <a:t>BR Switch</a:t>
-            </a:r>
-            <a:endParaRPr lang="zh-CN" altLang="en-US" dirty="0"/>
-          </a:p>
-        </p:txBody>
-      </p:sp>
-      <p:sp>
-        <p:nvSpPr>
-          <p:cNvPr id="6" name="圆角矩形 5"/>
-          <p:cNvSpPr/>
-          <p:nvPr/>
-        </p:nvSpPr>
-        <p:spPr>
-          <a:xfrm>
-            <a:off x="3894463" y="4232647"/>
-            <a:ext cx="1355074" cy="793215"/>
-          </a:xfrm>
-          <a:prstGeom prst="roundRect">
-            <a:avLst/>
-          </a:prstGeom>
-        </p:spPr>
-        <p:style>
-          <a:lnRef idx="1">
-            <a:schemeClr val="accent3"/>
-          </a:lnRef>
-          <a:fillRef idx="2">
-            <a:schemeClr val="accent3"/>
-          </a:fillRef>
-          <a:effectRef idx="1">
-            <a:schemeClr val="accent3"/>
-          </a:effectRef>
-          <a:fontRef idx="minor">
-            <a:schemeClr val="dk1"/>
-          </a:fontRef>
-        </p:style>
-        <p:txBody>
-          <a:bodyPr rtlCol="0" anchor="ctr"/>
-          <a:lstStyle/>
-          <a:p>
-            <a:pPr algn="ctr"/>
-            <a:r>
-              <a:rPr lang="en-US" altLang="zh-CN" dirty="0" smtClean="0"/>
-              <a:t>ISP IPv6 Network</a:t>
-            </a:r>
-            <a:endParaRPr lang="zh-CN" altLang="en-US" dirty="0"/>
-          </a:p>
-        </p:txBody>
-      </p:sp>
-      <p:sp>
-        <p:nvSpPr>
-          <p:cNvPr id="7" name="圆角矩形 6"/>
-          <p:cNvSpPr/>
-          <p:nvPr/>
-        </p:nvSpPr>
-        <p:spPr>
-          <a:xfrm>
-            <a:off x="898220" y="4232647"/>
-            <a:ext cx="1355074" cy="793215"/>
-          </a:xfrm>
-          <a:prstGeom prst="roundRect">
-            <a:avLst/>
-          </a:prstGeom>
-        </p:spPr>
-        <p:style>
-          <a:lnRef idx="1">
-            <a:schemeClr val="accent3"/>
-          </a:lnRef>
-          <a:fillRef idx="2">
-            <a:schemeClr val="accent3"/>
-          </a:fillRef>
-          <a:effectRef idx="1">
-            <a:schemeClr val="accent3"/>
-          </a:effectRef>
-          <a:fontRef idx="minor">
-            <a:schemeClr val="dk1"/>
-          </a:fontRef>
-        </p:style>
-        <p:txBody>
-          <a:bodyPr rtlCol="0" anchor="ctr"/>
-          <a:lstStyle/>
-          <a:p>
-            <a:pPr algn="ctr"/>
-            <a:r>
-              <a:rPr lang="en-US" altLang="zh-CN" dirty="0" smtClean="0"/>
-              <a:t>Customer Network</a:t>
-            </a:r>
-            <a:endParaRPr lang="zh-CN" altLang="en-US" dirty="0"/>
-          </a:p>
-        </p:txBody>
-      </p:sp>
-      <p:sp>
-        <p:nvSpPr>
-          <p:cNvPr id="8" name="圆角矩形 7"/>
-          <p:cNvSpPr/>
-          <p:nvPr/>
-        </p:nvSpPr>
-        <p:spPr>
-          <a:xfrm>
-            <a:off x="6952676" y="4232647"/>
-            <a:ext cx="1355074" cy="793215"/>
-          </a:xfrm>
-          <a:prstGeom prst="roundRect">
-            <a:avLst/>
-          </a:prstGeom>
-        </p:spPr>
-        <p:style>
-          <a:lnRef idx="1">
-            <a:schemeClr val="accent3"/>
-          </a:lnRef>
-          <a:fillRef idx="2">
-            <a:schemeClr val="accent3"/>
-          </a:fillRef>
-          <a:effectRef idx="1">
-            <a:schemeClr val="accent3"/>
-          </a:effectRef>
-          <a:fontRef idx="minor">
-            <a:schemeClr val="dk1"/>
-          </a:fontRef>
-        </p:style>
-        <p:txBody>
-          <a:bodyPr rtlCol="0" anchor="ctr"/>
-          <a:lstStyle/>
-          <a:p>
-            <a:pPr algn="ctr"/>
-            <a:r>
-              <a:rPr lang="en-US" altLang="zh-CN" dirty="0" smtClean="0"/>
-              <a:t>Internet</a:t>
-            </a:r>
-            <a:endParaRPr lang="zh-CN" altLang="en-US" dirty="0"/>
-          </a:p>
-        </p:txBody>
-      </p:sp>
-      <p:sp>
-        <p:nvSpPr>
-          <p:cNvPr id="9" name="圆角矩形 8"/>
-          <p:cNvSpPr/>
-          <p:nvPr/>
-        </p:nvSpPr>
-        <p:spPr>
-          <a:xfrm>
-            <a:off x="2401678" y="3421458"/>
-            <a:ext cx="4340644" cy="306302"/>
-          </a:xfrm>
-          <a:prstGeom prst="roundRect">
-            <a:avLst/>
-          </a:prstGeom>
-        </p:spPr>
-        <p:style>
-          <a:lnRef idx="1">
-            <a:schemeClr val="accent2"/>
-          </a:lnRef>
-          <a:fillRef idx="2">
-            <a:schemeClr val="accent2"/>
-          </a:fillRef>
-          <a:effectRef idx="1">
-            <a:schemeClr val="accent2"/>
-          </a:effectRef>
-          <a:fontRef idx="minor">
-            <a:schemeClr val="dk1"/>
-          </a:fontRef>
-        </p:style>
-        <p:txBody>
-          <a:bodyPr rtlCol="0" anchor="ctr"/>
-          <a:lstStyle/>
-          <a:p>
-            <a:pPr algn="ctr"/>
-            <a:r>
-              <a:rPr lang="en-US" altLang="zh-CN" dirty="0" smtClean="0"/>
-              <a:t>Controller</a:t>
-            </a:r>
-            <a:endParaRPr lang="zh-CN" altLang="en-US" dirty="0"/>
-          </a:p>
-        </p:txBody>
-      </p:sp>
-      <p:cxnSp>
-        <p:nvCxnSpPr>
-          <p:cNvPr id="11" name="直接连接符 10"/>
-          <p:cNvCxnSpPr>
-            <a:stCxn id="4" idx="3"/>
-            <a:endCxn id="6" idx="1"/>
-          </p:cNvCxnSpPr>
-          <p:nvPr/>
-        </p:nvCxnSpPr>
-        <p:spPr>
-          <a:xfrm>
-            <a:off x="3756752" y="4629255"/>
-            <a:ext cx="137711" cy="0"/>
-          </a:xfrm>
-          <a:prstGeom prst="line">
-            <a:avLst/>
-          </a:prstGeom>
-          <a:ln w="19050">
-            <a:headEnd type="none" w="med" len="med"/>
-            <a:tailEnd type="none" w="med" len="med"/>
-          </a:ln>
-        </p:spPr>
-        <p:style>
-          <a:lnRef idx="1">
-            <a:schemeClr val="dk1"/>
-          </a:lnRef>
-          <a:fillRef idx="0">
-            <a:schemeClr val="dk1"/>
-          </a:fillRef>
-          <a:effectRef idx="0">
-            <a:schemeClr val="dk1"/>
-          </a:effectRef>
-          <a:fontRef idx="minor">
-            <a:schemeClr val="tx1"/>
-          </a:fontRef>
-        </p:style>
-      </p:cxnSp>
-      <p:cxnSp>
-        <p:nvCxnSpPr>
-          <p:cNvPr id="12" name="直接连接符 11"/>
-          <p:cNvCxnSpPr>
-            <a:stCxn id="6" idx="3"/>
-            <a:endCxn id="5" idx="1"/>
-          </p:cNvCxnSpPr>
-          <p:nvPr/>
-        </p:nvCxnSpPr>
-        <p:spPr>
-          <a:xfrm>
-            <a:off x="5249537" y="4629255"/>
-            <a:ext cx="140465" cy="0"/>
-          </a:xfrm>
-          <a:prstGeom prst="line">
-            <a:avLst/>
-          </a:prstGeom>
-          <a:ln w="19050">
-            <a:headEnd type="none" w="med" len="med"/>
-            <a:tailEnd type="none" w="med" len="med"/>
-          </a:ln>
-        </p:spPr>
-        <p:style>
-          <a:lnRef idx="1">
-            <a:schemeClr val="dk1"/>
-          </a:lnRef>
-          <a:fillRef idx="0">
-            <a:schemeClr val="dk1"/>
-          </a:fillRef>
-          <a:effectRef idx="0">
-            <a:schemeClr val="dk1"/>
-          </a:effectRef>
-          <a:fontRef idx="minor">
-            <a:schemeClr val="tx1"/>
-          </a:fontRef>
-        </p:style>
-      </p:cxnSp>
-      <p:cxnSp>
-        <p:nvCxnSpPr>
-          <p:cNvPr id="13" name="直接连接符 12"/>
-          <p:cNvCxnSpPr>
-            <a:stCxn id="5" idx="3"/>
-            <a:endCxn id="8" idx="1"/>
-          </p:cNvCxnSpPr>
-          <p:nvPr/>
-        </p:nvCxnSpPr>
-        <p:spPr>
-          <a:xfrm>
-            <a:off x="6745076" y="4629255"/>
-            <a:ext cx="207600" cy="0"/>
-          </a:xfrm>
-          <a:prstGeom prst="line">
-            <a:avLst/>
-          </a:prstGeom>
-          <a:ln w="19050">
-            <a:headEnd type="none" w="med" len="med"/>
-            <a:tailEnd type="none" w="med" len="med"/>
-          </a:ln>
-        </p:spPr>
-        <p:style>
-          <a:lnRef idx="1">
-            <a:schemeClr val="dk1"/>
-          </a:lnRef>
-          <a:fillRef idx="0">
-            <a:schemeClr val="dk1"/>
-          </a:fillRef>
-          <a:effectRef idx="0">
-            <a:schemeClr val="dk1"/>
-          </a:effectRef>
-          <a:fontRef idx="minor">
-            <a:schemeClr val="tx1"/>
-          </a:fontRef>
-        </p:style>
-      </p:cxnSp>
-      <p:cxnSp>
-        <p:nvCxnSpPr>
-          <p:cNvPr id="16" name="直接连接符 15"/>
-          <p:cNvCxnSpPr>
-            <a:stCxn id="7" idx="3"/>
-            <a:endCxn id="4" idx="1"/>
-          </p:cNvCxnSpPr>
-          <p:nvPr/>
-        </p:nvCxnSpPr>
-        <p:spPr>
-          <a:xfrm>
-            <a:off x="2253294" y="4629255"/>
-            <a:ext cx="148384" cy="0"/>
-          </a:xfrm>
-          <a:prstGeom prst="line">
-            <a:avLst/>
-          </a:prstGeom>
-          <a:ln w="19050">
-            <a:headEnd type="none" w="med" len="med"/>
-            <a:tailEnd type="none" w="med" len="med"/>
-          </a:ln>
-        </p:spPr>
-        <p:style>
-          <a:lnRef idx="1">
-            <a:schemeClr val="dk1"/>
-          </a:lnRef>
-          <a:fillRef idx="0">
-            <a:schemeClr val="dk1"/>
-          </a:fillRef>
-          <a:effectRef idx="0">
-            <a:schemeClr val="dk1"/>
-          </a:effectRef>
-          <a:fontRef idx="minor">
-            <a:schemeClr val="tx1"/>
-          </a:fontRef>
-        </p:style>
-      </p:cxnSp>
-      <p:cxnSp>
-        <p:nvCxnSpPr>
-          <p:cNvPr id="29" name="直接箭头连接符 28"/>
-          <p:cNvCxnSpPr/>
-          <p:nvPr/>
-        </p:nvCxnSpPr>
-        <p:spPr>
-          <a:xfrm flipV="1">
-            <a:off x="2842352" y="3727760"/>
-            <a:ext cx="0" cy="504887"/>
-          </a:xfrm>
-          <a:prstGeom prst="straightConnector1">
-            <a:avLst/>
-          </a:prstGeom>
-          <a:ln w="19050">
-            <a:headEnd type="none" w="med" len="med"/>
-            <a:tailEnd type="arrow" w="med" len="med"/>
-          </a:ln>
-        </p:spPr>
-        <p:style>
-          <a:lnRef idx="1">
-            <a:schemeClr val="dk1"/>
-          </a:lnRef>
-          <a:fillRef idx="0">
-            <a:schemeClr val="dk1"/>
-          </a:fillRef>
-          <a:effectRef idx="0">
-            <a:schemeClr val="dk1"/>
-          </a:effectRef>
-          <a:fontRef idx="minor">
-            <a:schemeClr val="tx1"/>
-          </a:fontRef>
-        </p:style>
-      </p:cxnSp>
-      <p:cxnSp>
-        <p:nvCxnSpPr>
-          <p:cNvPr id="30" name="直接箭头连接符 29"/>
-          <p:cNvCxnSpPr/>
-          <p:nvPr/>
-        </p:nvCxnSpPr>
-        <p:spPr>
-          <a:xfrm flipV="1">
-            <a:off x="3294043" y="3727760"/>
-            <a:ext cx="0" cy="504887"/>
-          </a:xfrm>
-          <a:prstGeom prst="straightConnector1">
-            <a:avLst/>
-          </a:prstGeom>
-          <a:ln w="19050">
-            <a:headEnd type="arrow" w="med" len="med"/>
-            <a:tailEnd type="none" w="med" len="med"/>
-          </a:ln>
-        </p:spPr>
-        <p:style>
-          <a:lnRef idx="1">
-            <a:schemeClr val="dk1"/>
-          </a:lnRef>
-          <a:fillRef idx="0">
-            <a:schemeClr val="dk1"/>
-          </a:fillRef>
-          <a:effectRef idx="0">
-            <a:schemeClr val="dk1"/>
-          </a:effectRef>
-          <a:fontRef idx="minor">
-            <a:schemeClr val="tx1"/>
-          </a:fontRef>
-        </p:style>
-      </p:cxnSp>
-      <p:cxnSp>
-        <p:nvCxnSpPr>
-          <p:cNvPr id="31" name="直接箭头连接符 30"/>
-          <p:cNvCxnSpPr/>
-          <p:nvPr/>
-        </p:nvCxnSpPr>
-        <p:spPr>
-          <a:xfrm flipV="1">
-            <a:off x="5794872" y="3727760"/>
-            <a:ext cx="0" cy="504887"/>
-          </a:xfrm>
-          <a:prstGeom prst="straightConnector1">
-            <a:avLst/>
-          </a:prstGeom>
-          <a:ln w="19050">
-            <a:headEnd type="arrow" w="med" len="med"/>
-            <a:tailEnd type="none" w="med" len="med"/>
-          </a:ln>
-        </p:spPr>
-        <p:style>
-          <a:lnRef idx="1">
-            <a:schemeClr val="dk1"/>
-          </a:lnRef>
-          <a:fillRef idx="0">
-            <a:schemeClr val="dk1"/>
-          </a:fillRef>
-          <a:effectRef idx="0">
-            <a:schemeClr val="dk1"/>
-          </a:effectRef>
-          <a:fontRef idx="minor">
-            <a:schemeClr val="tx1"/>
-          </a:fontRef>
-        </p:style>
-      </p:cxnSp>
-      <p:cxnSp>
-        <p:nvCxnSpPr>
-          <p:cNvPr id="32" name="直接箭头连接符 31"/>
-          <p:cNvCxnSpPr/>
-          <p:nvPr/>
-        </p:nvCxnSpPr>
-        <p:spPr>
-          <a:xfrm flipV="1">
-            <a:off x="6246563" y="3727760"/>
-            <a:ext cx="0" cy="504887"/>
-          </a:xfrm>
-          <a:prstGeom prst="straightConnector1">
-            <a:avLst/>
-          </a:prstGeom>
-          <a:ln w="19050">
-            <a:headEnd type="none" w="med" len="med"/>
-            <a:tailEnd type="arrow" w="med" len="med"/>
-          </a:ln>
-        </p:spPr>
-        <p:style>
-          <a:lnRef idx="1">
-            <a:schemeClr val="dk1"/>
-          </a:lnRef>
-          <a:fillRef idx="0">
-            <a:schemeClr val="dk1"/>
-          </a:fillRef>
-          <a:effectRef idx="0">
-            <a:schemeClr val="dk1"/>
-          </a:effectRef>
-          <a:fontRef idx="minor">
-            <a:schemeClr val="tx1"/>
-          </a:fontRef>
-        </p:style>
-      </p:cxnSp>
-      <p:sp>
-        <p:nvSpPr>
-          <p:cNvPr id="33" name="矩形标注 32"/>
-          <p:cNvSpPr/>
-          <p:nvPr/>
-        </p:nvSpPr>
-        <p:spPr>
-          <a:xfrm>
-            <a:off x="1425191" y="5363061"/>
-            <a:ext cx="2331561" cy="1210510"/>
-          </a:xfrm>
-          <a:prstGeom prst="wedgeRectCallout">
-            <a:avLst>
-              <a:gd name="adj1" fmla="val 22637"/>
-              <a:gd name="adj2" fmla="val -76458"/>
-            </a:avLst>
-          </a:prstGeom>
-        </p:spPr>
-        <p:style>
-          <a:lnRef idx="1">
-            <a:schemeClr val="accent6"/>
-          </a:lnRef>
-          <a:fillRef idx="2">
-            <a:schemeClr val="accent6"/>
-          </a:fillRef>
-          <a:effectRef idx="1">
-            <a:schemeClr val="accent6"/>
-          </a:effectRef>
-          <a:fontRef idx="minor">
-            <a:schemeClr val="dk1"/>
-          </a:fontRef>
-        </p:style>
-        <p:txBody>
-          <a:bodyPr rtlCol="0" anchor="ctr"/>
-          <a:lstStyle/>
-          <a:p>
-            <a:pPr marL="285750" indent="-285750">
-              <a:buFont typeface="Arial" panose="020B0604020202020204" pitchFamily="34" charset="0"/>
-              <a:buChar char="•"/>
-            </a:pPr>
-            <a:r>
-              <a:rPr lang="en-US" altLang="zh-CN" sz="1400" dirty="0" err="1" smtClean="0"/>
-              <a:t>OpenFlow</a:t>
-            </a:r>
-            <a:r>
-              <a:rPr lang="en-US" altLang="zh-CN" sz="1400" dirty="0" smtClean="0"/>
-              <a:t> Switch</a:t>
-            </a:r>
-          </a:p>
-          <a:p>
-            <a:pPr marL="285750" indent="-285750">
-              <a:buFont typeface="Arial" panose="020B0604020202020204" pitchFamily="34" charset="0"/>
-              <a:buChar char="•"/>
-            </a:pPr>
-            <a:r>
-              <a:rPr lang="en-US" altLang="zh-CN" sz="1400" dirty="0" smtClean="0"/>
-              <a:t>Replace </a:t>
-            </a:r>
-            <a:r>
-              <a:rPr lang="en-US" altLang="zh-CN" sz="1400" dirty="0"/>
-              <a:t>MAP CE, lwB4, </a:t>
-            </a:r>
-            <a:r>
-              <a:rPr lang="en-US" altLang="zh-CN" sz="1400" dirty="0" smtClean="0"/>
-              <a:t>…</a:t>
-            </a:r>
-          </a:p>
-          <a:p>
-            <a:pPr marL="285750" indent="-285750">
-              <a:buFont typeface="Arial" panose="020B0604020202020204" pitchFamily="34" charset="0"/>
-              <a:buChar char="•"/>
-            </a:pPr>
-            <a:r>
-              <a:rPr lang="en-US" altLang="zh-CN" sz="1400" dirty="0" smtClean="0"/>
-              <a:t>As </a:t>
-            </a:r>
-            <a:r>
-              <a:rPr lang="en-US" altLang="zh-CN" sz="1400" dirty="0"/>
-              <a:t>customer network </a:t>
-            </a:r>
-            <a:r>
-              <a:rPr lang="en-US" altLang="zh-CN" sz="1400" dirty="0" smtClean="0"/>
-              <a:t>gateway</a:t>
-            </a:r>
-            <a:endParaRPr lang="en-US" altLang="zh-CN" sz="1400" dirty="0"/>
-          </a:p>
-        </p:txBody>
-      </p:sp>
-      <p:sp>
-        <p:nvSpPr>
-          <p:cNvPr id="34" name="矩形标注 33"/>
-          <p:cNvSpPr/>
-          <p:nvPr/>
-        </p:nvSpPr>
-        <p:spPr>
-          <a:xfrm>
-            <a:off x="5319769" y="5419294"/>
-            <a:ext cx="1748393" cy="901154"/>
-          </a:xfrm>
-          <a:prstGeom prst="wedgeRectCallout">
-            <a:avLst>
-              <a:gd name="adj1" fmla="val -16756"/>
-              <a:gd name="adj2" fmla="val -91205"/>
-            </a:avLst>
-          </a:prstGeom>
-        </p:spPr>
-        <p:style>
-          <a:lnRef idx="1">
-            <a:schemeClr val="accent6"/>
-          </a:lnRef>
-          <a:fillRef idx="2">
-            <a:schemeClr val="accent6"/>
-          </a:fillRef>
-          <a:effectRef idx="1">
-            <a:schemeClr val="accent6"/>
-          </a:effectRef>
-          <a:fontRef idx="minor">
-            <a:schemeClr val="dk1"/>
-          </a:fontRef>
-        </p:style>
-        <p:txBody>
-          <a:bodyPr rtlCol="0" anchor="ctr"/>
-          <a:lstStyle/>
-          <a:p>
-            <a:pPr marL="285750" indent="-285750">
-              <a:buFont typeface="Arial" panose="020B0604020202020204" pitchFamily="34" charset="0"/>
-              <a:buChar char="•"/>
-            </a:pPr>
-            <a:r>
-              <a:rPr lang="en-US" altLang="zh-CN" sz="1400" dirty="0" err="1" smtClean="0"/>
-              <a:t>OpenFlow</a:t>
-            </a:r>
-            <a:r>
-              <a:rPr lang="en-US" altLang="zh-CN" sz="1400" dirty="0" smtClean="0"/>
-              <a:t> Switch</a:t>
-            </a:r>
-          </a:p>
-          <a:p>
-            <a:pPr marL="285750" indent="-285750">
-              <a:buFont typeface="Arial" panose="020B0604020202020204" pitchFamily="34" charset="0"/>
-              <a:buChar char="•"/>
-            </a:pPr>
-            <a:r>
-              <a:rPr lang="en-US" altLang="zh-CN" sz="1400" dirty="0" smtClean="0"/>
-              <a:t>Replace </a:t>
-            </a:r>
-            <a:r>
-              <a:rPr lang="en-US" altLang="zh-CN" sz="1400" dirty="0"/>
-              <a:t>MAP BR, </a:t>
-            </a:r>
-            <a:r>
-              <a:rPr lang="en-US" altLang="zh-CN" sz="1400" dirty="0" err="1"/>
-              <a:t>lwAFTR</a:t>
-            </a:r>
-            <a:r>
-              <a:rPr lang="en-US" altLang="zh-CN" sz="1400" dirty="0"/>
-              <a:t>, </a:t>
-            </a:r>
-            <a:r>
-              <a:rPr lang="en-US" altLang="zh-CN" sz="1400" dirty="0" smtClean="0"/>
-              <a:t>…</a:t>
-            </a:r>
-          </a:p>
-        </p:txBody>
-      </p:sp>
-      <p:sp>
-        <p:nvSpPr>
-          <p:cNvPr id="35" name="矩形标注 34"/>
-          <p:cNvSpPr/>
-          <p:nvPr/>
-        </p:nvSpPr>
-        <p:spPr>
-          <a:xfrm>
-            <a:off x="4523609" y="1996991"/>
-            <a:ext cx="3492347" cy="973719"/>
-          </a:xfrm>
-          <a:prstGeom prst="wedgeRectCallout">
-            <a:avLst>
-              <a:gd name="adj1" fmla="val -45752"/>
-              <a:gd name="adj2" fmla="val 93560"/>
-            </a:avLst>
-          </a:prstGeom>
-        </p:spPr>
-        <p:style>
-          <a:lnRef idx="1">
-            <a:schemeClr val="accent2"/>
-          </a:lnRef>
-          <a:fillRef idx="2">
-            <a:schemeClr val="accent2"/>
-          </a:fillRef>
-          <a:effectRef idx="1">
-            <a:schemeClr val="accent2"/>
-          </a:effectRef>
-          <a:fontRef idx="minor">
-            <a:schemeClr val="dk1"/>
-          </a:fontRef>
-        </p:style>
-        <p:txBody>
-          <a:bodyPr rtlCol="0" anchor="ctr"/>
-          <a:lstStyle/>
-          <a:p>
-            <a:pPr marL="285750" lvl="1" indent="-285750">
-              <a:buFont typeface="Arial" panose="020B0604020202020204" pitchFamily="34" charset="0"/>
-              <a:buChar char="•"/>
-            </a:pPr>
-            <a:r>
-              <a:rPr lang="en-US" altLang="zh-CN" sz="1600" dirty="0" err="1" smtClean="0"/>
-              <a:t>OpenFlow</a:t>
-            </a:r>
-            <a:r>
-              <a:rPr lang="en-US" altLang="zh-CN" sz="1600" dirty="0" smtClean="0"/>
-              <a:t> Controller</a:t>
-            </a:r>
-          </a:p>
-          <a:p>
-            <a:pPr marL="285750" lvl="1" indent="-285750">
-              <a:buFont typeface="Arial" panose="020B0604020202020204" pitchFamily="34" charset="0"/>
-              <a:buChar char="•"/>
-            </a:pPr>
-            <a:r>
-              <a:rPr lang="en-US" altLang="zh-CN" sz="1600" dirty="0" smtClean="0"/>
-              <a:t>Manage CPE/BR </a:t>
-            </a:r>
-            <a:r>
-              <a:rPr lang="en-US" altLang="zh-CN" sz="1600" dirty="0"/>
-              <a:t>Switches: IP addressing, forwarding states, etc.</a:t>
-            </a:r>
-          </a:p>
-          <a:p>
-            <a:pPr marL="285750" lvl="1" indent="-285750">
-              <a:buFont typeface="Arial" panose="020B0604020202020204" pitchFamily="34" charset="0"/>
-              <a:buChar char="•"/>
-            </a:pPr>
-            <a:r>
-              <a:rPr lang="en-US" altLang="zh-CN" sz="1600" dirty="0" smtClean="0"/>
-              <a:t>May combined </a:t>
-            </a:r>
-            <a:r>
-              <a:rPr lang="en-US" altLang="zh-CN" sz="1600" dirty="0" smtClean="0"/>
-              <a:t>with DHCPv6 server</a:t>
-            </a:r>
-            <a:endParaRPr lang="en-US" altLang="zh-CN" sz="1600" dirty="0"/>
-          </a:p>
-        </p:txBody>
-      </p:sp>
-    </p:spTree>
-    <p:extLst>
-      <p:ext uri="{BB962C8B-B14F-4D97-AF65-F5344CB8AC3E}">
-        <p14:creationId xmlns:p14="http://schemas.microsoft.com/office/powerpoint/2010/main" val="295622446"/>
-      </p:ext>
-    </p:extLst>
-  </p:cSld>
-  <p:clrMapOvr>
-    <a:masterClrMapping/>
-  </p:clrMapOvr>
-</p:sld>
-</file>
-
-<file path=ppt/slides/slide5.xml><?xml version="1.0" encoding="utf-8"?>
-<p:sld xmlns:a="http://schemas.openxmlformats.org/drawingml/2006/main" xmlns:r="http://schemas.openxmlformats.org/officeDocument/2006/relationships" xmlns:p="http://schemas.openxmlformats.org/presentationml/2006/main">
+<p:sld xmlns:a="http://schemas.openxmlformats.org/drawingml/2006/main" xmlns:r="http://schemas.openxmlformats.org/officeDocument/2006/relationships" xmlns:p="http://schemas.openxmlformats.org/presentationml/2006/main" show="0">
   <p:cSld>
     <p:spTree>
       <p:nvGrpSpPr>
@@ -6615,30 +6513,14 @@
             <a:pPr lvl="2"/>
             <a:r>
               <a:rPr lang="en-US" altLang="zh-CN" sz="1600" dirty="0" smtClean="0"/>
-              <a:t>E.g. </a:t>
-            </a:r>
-            <a:r>
-              <a:rPr lang="en-US" altLang="zh-CN" sz="1600" dirty="0" smtClean="0"/>
-              <a:t> BR Address:                     Destination </a:t>
-            </a:r>
-            <a:r>
-              <a:rPr lang="en-US" altLang="zh-CN" sz="1600" dirty="0" smtClean="0"/>
-              <a:t>address  of CPE’s tunnel encapsulation action</a:t>
+              <a:t>E.g.  BR Address:                     Destination address  of CPE’s tunnel encapsulation action</a:t>
             </a:r>
             <a:br>
               <a:rPr lang="en-US" altLang="zh-CN" sz="1600" dirty="0" smtClean="0"/>
             </a:br>
             <a:r>
               <a:rPr lang="en-US" altLang="zh-CN" sz="1600" dirty="0" smtClean="0"/>
-              <a:t>        IPv4 address and </a:t>
-            </a:r>
-            <a:r>
-              <a:rPr lang="en-US" altLang="zh-CN" sz="1600" dirty="0" smtClean="0"/>
-              <a:t>PSID:  Matching </a:t>
-            </a:r>
-            <a:r>
-              <a:rPr lang="en-US" altLang="zh-CN" sz="1600" dirty="0" smtClean="0"/>
-              <a:t>conditions of BR’s </a:t>
+              <a:t>        IPv4 address and PSID:  Matching conditions of BR’s </a:t>
             </a:r>
             <a:r>
               <a:rPr lang="en-US" altLang="zh-CN" sz="1600" dirty="0" err="1" smtClean="0"/>
@@ -6646,26 +6528,14 @@
             </a:r>
             <a:r>
               <a:rPr lang="en-US" altLang="zh-CN" sz="1600" dirty="0" smtClean="0"/>
-              <a:t> </a:t>
-            </a:r>
-            <a:r>
-              <a:rPr lang="en-US" altLang="zh-CN" sz="1600" dirty="0" smtClean="0"/>
-              <a:t>rules,</a:t>
+              <a:t> rules,</a:t>
             </a:r>
             <a:br>
               <a:rPr lang="en-US" altLang="zh-CN" sz="1600" dirty="0" smtClean="0"/>
             </a:br>
             <a:r>
               <a:rPr lang="en-US" altLang="zh-CN" sz="1600" dirty="0" smtClean="0"/>
-              <a:t>                                                    or values of set-field </a:t>
-            </a:r>
-            <a:r>
-              <a:rPr lang="en-US" altLang="zh-CN" sz="1600" dirty="0" smtClean="0"/>
-              <a:t>actions (</a:t>
-            </a:r>
-            <a:r>
-              <a:rPr lang="en-US" altLang="zh-CN" sz="1600" dirty="0" smtClean="0"/>
-              <a:t>to implement NAT44)</a:t>
+              <a:t>                                                    or values of set-field actions (to implement NAT44)</a:t>
             </a:r>
           </a:p>
         </p:txBody>
@@ -6687,7 +6557,7 @@
           <a:p>
             <a:fld id="{F7584EF2-83F3-4D0E-806F-3F2B1A6BFA56}" type="slidenum">
               <a:rPr lang="zh-CN" altLang="en-US" smtClean="0"/>
-              <a:t>5</a:t>
+              <a:t>4</a:t>
             </a:fld>
             <a:endParaRPr lang="zh-CN" altLang="en-US" dirty="0"/>
           </a:p>
@@ -6744,6 +6614,312 @@
   <p:clrMapOvr>
     <a:masterClrMapping/>
   </p:clrMapOvr>
+  <mc:AlternateContent xmlns:mc="http://schemas.openxmlformats.org/markup-compatibility/2006">
+    <mc:Choice xmlns:p14="http://schemas.microsoft.com/office/powerpoint/2010/main" Requires="p14">
+      <p:transition spd="slow" p14:dur="2000"/>
+    </mc:Choice>
+    <mc:Fallback>
+      <p:transition spd="slow"/>
+    </mc:Fallback>
+  </mc:AlternateContent>
+  <p:timing>
+    <p:tnLst>
+      <p:par>
+        <p:cTn id="1" dur="indefinite" restart="never" nodeType="tmRoot"/>
+      </p:par>
+    </p:tnLst>
+  </p:timing>
+</p:sld>
+</file>
+
+<file path=ppt/slides/slide5.xml><?xml version="1.0" encoding="utf-8"?>
+<p:sld xmlns:a="http://schemas.openxmlformats.org/drawingml/2006/main" xmlns:r="http://schemas.openxmlformats.org/officeDocument/2006/relationships" xmlns:p="http://schemas.openxmlformats.org/presentationml/2006/main">
+  <p:cSld>
+    <p:spTree>
+      <p:nvGrpSpPr>
+        <p:cNvPr id="1" name=""/>
+        <p:cNvGrpSpPr/>
+        <p:nvPr/>
+      </p:nvGrpSpPr>
+      <p:grpSpPr>
+        <a:xfrm>
+          <a:off x="0" y="0"/>
+          <a:ext cx="0" cy="0"/>
+          <a:chOff x="0" y="0"/>
+          <a:chExt cx="0" cy="0"/>
+        </a:xfrm>
+      </p:grpSpPr>
+      <p:sp>
+        <p:nvSpPr>
+          <p:cNvPr id="2" name="标题 1"/>
+          <p:cNvSpPr>
+            <a:spLocks noGrp="1"/>
+          </p:cNvSpPr>
+          <p:nvPr>
+            <p:ph type="title"/>
+          </p:nvPr>
+        </p:nvSpPr>
+        <p:spPr>
+          <a:xfrm>
+            <a:off x="457200" y="274638"/>
+            <a:ext cx="8229600" cy="1143000"/>
+          </a:xfrm>
+        </p:spPr>
+        <p:txBody>
+          <a:bodyPr/>
+          <a:lstStyle/>
+          <a:p>
+            <a:pPr algn="ctr"/>
+            <a:r>
+              <a:rPr lang="en-US" altLang="zh-CN" dirty="0"/>
+              <a:t>Forwarding </a:t>
+            </a:r>
+            <a:r>
+              <a:rPr lang="en-US" altLang="zh-CN" dirty="0" smtClean="0">
+                <a:solidFill>
+                  <a:schemeClr val="tx1"/>
+                </a:solidFill>
+              </a:rPr>
+              <a:t>Configuration</a:t>
+            </a:r>
+            <a:endParaRPr lang="zh-CN" altLang="en-US" dirty="0">
+              <a:solidFill>
+                <a:schemeClr val="tx1"/>
+              </a:solidFill>
+            </a:endParaRPr>
+          </a:p>
+        </p:txBody>
+      </p:sp>
+      <p:sp>
+        <p:nvSpPr>
+          <p:cNvPr id="4" name="Rectangle 2"/>
+          <p:cNvSpPr>
+            <a:spLocks noChangeArrowheads="1"/>
+          </p:cNvSpPr>
+          <p:nvPr/>
+        </p:nvSpPr>
+        <p:spPr bwMode="auto">
+          <a:xfrm>
+            <a:off x="0" y="0"/>
+            <a:ext cx="9144000" cy="0"/>
+          </a:xfrm>
+          <a:prstGeom prst="rect">
+            <a:avLst/>
+          </a:prstGeom>
+          <a:noFill/>
+          <a:ln>
+            <a:noFill/>
+          </a:ln>
+          <a:effectLst/>
+          <a:extLst>
+            <a:ext uri="{909E8E84-426E-40DD-AFC4-6F175D3DCCD1}">
+              <a14:hiddenFill xmlns:a14="http://schemas.microsoft.com/office/drawing/2010/main">
+                <a:solidFill>
+                  <a:schemeClr val="accent1"/>
+                </a:solidFill>
+              </a14:hiddenFill>
+            </a:ext>
+            <a:ext uri="{91240B29-F687-4F45-9708-019B960494DF}">
+              <a14:hiddenLine xmlns:a14="http://schemas.microsoft.com/office/drawing/2010/main" w="9525">
+                <a:solidFill>
+                  <a:schemeClr val="tx1"/>
+                </a:solidFill>
+                <a:miter lim="800000"/>
+                <a:headEnd/>
+                <a:tailEnd/>
+              </a14:hiddenLine>
+            </a:ext>
+            <a:ext uri="{AF507438-7753-43E0-B8FC-AC1667EBCBE1}">
+              <a14:hiddenEffects xmlns:a14="http://schemas.microsoft.com/office/drawing/2010/main">
+                <a:effectLst>
+                  <a:outerShdw dist="35921" dir="2700000" algn="ctr" rotWithShape="0">
+                    <a:schemeClr val="bg2"/>
+                  </a:outerShdw>
+                </a:effectLst>
+              </a14:hiddenEffects>
+            </a:ext>
+          </a:extLst>
+        </p:spPr>
+        <p:txBody>
+          <a:bodyPr vert="horz" wrap="none" lIns="91440" tIns="45720" rIns="91440" bIns="45720" numCol="1" anchor="ctr" anchorCtr="0" compatLnSpc="1">
+            <a:prstTxWarp prst="textNoShape">
+              <a:avLst/>
+            </a:prstTxWarp>
+            <a:spAutoFit/>
+          </a:bodyPr>
+          <a:lstStyle/>
+          <a:p>
+            <a:endParaRPr lang="zh-CN" altLang="en-US"/>
+          </a:p>
+        </p:txBody>
+      </p:sp>
+      <p:sp>
+        <p:nvSpPr>
+          <p:cNvPr id="7" name="内容占位符 2"/>
+          <p:cNvSpPr>
+            <a:spLocks noGrp="1"/>
+          </p:cNvSpPr>
+          <p:nvPr>
+            <p:ph idx="1"/>
+          </p:nvPr>
+        </p:nvSpPr>
+        <p:spPr>
+          <a:xfrm>
+            <a:off x="395536" y="1556791"/>
+            <a:ext cx="8686800" cy="4799559"/>
+          </a:xfrm>
+        </p:spPr>
+        <p:txBody>
+          <a:bodyPr>
+            <a:noAutofit/>
+          </a:bodyPr>
+          <a:lstStyle/>
+          <a:p>
+            <a:r>
+              <a:rPr lang="en-US" altLang="zh-CN" dirty="0" smtClean="0"/>
+              <a:t>Forwarding configuration</a:t>
+            </a:r>
+          </a:p>
+          <a:p>
+            <a:r>
+              <a:rPr lang="en-US" altLang="zh-CN" sz="2800" dirty="0" smtClean="0"/>
+              <a:t>Use </a:t>
+            </a:r>
+            <a:r>
+              <a:rPr lang="en-US" altLang="zh-CN" sz="2800" dirty="0" err="1"/>
+              <a:t>Openflow</a:t>
+            </a:r>
+            <a:r>
+              <a:rPr lang="en-US" altLang="zh-CN" sz="2800" dirty="0"/>
+              <a:t> for configuring Switches’ forwarding </a:t>
+            </a:r>
+            <a:r>
+              <a:rPr lang="en-US" altLang="zh-CN" sz="2800" dirty="0" smtClean="0"/>
+              <a:t>rules</a:t>
+            </a:r>
+          </a:p>
+          <a:p>
+            <a:r>
+              <a:rPr lang="en-US" altLang="zh-CN" sz="2800" dirty="0" smtClean="0"/>
+              <a:t>Rule </a:t>
+            </a:r>
+            <a:r>
+              <a:rPr lang="en-US" altLang="zh-CN" sz="2800" dirty="0"/>
+              <a:t>format: Match </a:t>
+            </a:r>
+            <a:r>
+              <a:rPr lang="en-US" altLang="zh-CN" sz="2800" dirty="0" smtClean="0"/>
+              <a:t>– Action</a:t>
+            </a:r>
+          </a:p>
+          <a:p>
+            <a:r>
+              <a:rPr lang="en-US" altLang="zh-CN" sz="2800" dirty="0" err="1" smtClean="0"/>
+              <a:t>Softwire</a:t>
+            </a:r>
+            <a:r>
+              <a:rPr lang="en-US" altLang="zh-CN" sz="2800" dirty="0" smtClean="0"/>
+              <a:t> </a:t>
+            </a:r>
+            <a:r>
+              <a:rPr lang="en-US" altLang="zh-CN" sz="2800" dirty="0"/>
+              <a:t>information can be embedded into a rule, no provisioning </a:t>
+            </a:r>
+            <a:r>
+              <a:rPr lang="en-US" altLang="zh-CN" sz="2800" dirty="0" smtClean="0"/>
+              <a:t>needed</a:t>
+            </a:r>
+          </a:p>
+          <a:p>
+            <a:pPr lvl="1"/>
+            <a:r>
+              <a:rPr lang="en-US" altLang="zh-CN" dirty="0"/>
+              <a:t>BR Address: </a:t>
+            </a:r>
+            <a:r>
+              <a:rPr lang="en-US" altLang="zh-CN" dirty="0" smtClean="0"/>
+              <a:t>Destination </a:t>
+            </a:r>
+            <a:r>
+              <a:rPr lang="en-US" altLang="zh-CN" dirty="0"/>
+              <a:t>address  of CPE’s tunnel encapsulation </a:t>
+            </a:r>
+            <a:r>
+              <a:rPr lang="en-US" altLang="zh-CN" dirty="0" smtClean="0"/>
+              <a:t>action</a:t>
+            </a:r>
+          </a:p>
+          <a:p>
+            <a:pPr lvl="1"/>
+            <a:r>
+              <a:rPr lang="en-US" altLang="zh-CN" dirty="0"/>
+              <a:t>IPv4 address and PSID:  Matching conditions of BR’s </a:t>
+            </a:r>
+            <a:r>
+              <a:rPr lang="en-US" altLang="zh-CN" dirty="0" err="1"/>
+              <a:t>downstreaming</a:t>
+            </a:r>
+            <a:r>
+              <a:rPr lang="en-US" altLang="zh-CN" dirty="0"/>
+              <a:t> rules</a:t>
+            </a:r>
+            <a:r>
+              <a:rPr lang="en-US" altLang="zh-CN" dirty="0" smtClean="0"/>
+              <a:t>, or </a:t>
+            </a:r>
+            <a:r>
+              <a:rPr lang="en-US" altLang="zh-CN" dirty="0"/>
+              <a:t>values of set-field actions (to implement NAT44</a:t>
+            </a:r>
+            <a:r>
+              <a:rPr lang="en-US" altLang="zh-CN" dirty="0" smtClean="0"/>
+              <a:t>)</a:t>
+            </a:r>
+            <a:endParaRPr lang="en-US" altLang="zh-CN" sz="1600" dirty="0" smtClean="0"/>
+          </a:p>
+        </p:txBody>
+      </p:sp>
+      <p:sp>
+        <p:nvSpPr>
+          <p:cNvPr id="3" name="灯片编号占位符 2"/>
+          <p:cNvSpPr>
+            <a:spLocks noGrp="1"/>
+          </p:cNvSpPr>
+          <p:nvPr>
+            <p:ph type="sldNum" sz="quarter" idx="12"/>
+          </p:nvPr>
+        </p:nvSpPr>
+        <p:spPr/>
+        <p:txBody>
+          <a:bodyPr/>
+          <a:lstStyle/>
+          <a:p>
+            <a:fld id="{F7584EF2-83F3-4D0E-806F-3F2B1A6BFA56}" type="slidenum">
+              <a:rPr lang="zh-CN" altLang="en-US" smtClean="0"/>
+              <a:t>5</a:t>
+            </a:fld>
+            <a:endParaRPr lang="zh-CN" altLang="en-US" dirty="0"/>
+          </a:p>
+        </p:txBody>
+      </p:sp>
+    </p:spTree>
+    <p:extLst>
+      <p:ext uri="{BB962C8B-B14F-4D97-AF65-F5344CB8AC3E}">
+        <p14:creationId xmlns:p14="http://schemas.microsoft.com/office/powerpoint/2010/main" val="2397428970"/>
+      </p:ext>
+    </p:extLst>
+  </p:cSld>
+  <p:clrMapOvr>
+    <a:masterClrMapping/>
+  </p:clrMapOvr>
+  <mc:AlternateContent xmlns:mc="http://schemas.openxmlformats.org/markup-compatibility/2006">
+    <mc:Choice xmlns:p14="http://schemas.microsoft.com/office/powerpoint/2010/main" Requires="p14">
+      <p:transition spd="slow" p14:dur="2000"/>
+    </mc:Choice>
+    <mc:Fallback>
+      <p:transition spd="slow"/>
+    </mc:Fallback>
+  </mc:AlternateContent>
   <p:timing>
     <p:tnLst>
       <p:par>

</xml_diff>